<commit_message>
Implement search functionality improvements and bug fixes
- Add sections and notes extraction to content processing
- Implement sections and notes filtering in search functions
- Fix query_slides grammar error handling to return zero results for invalid criteria
- Fix extract_table_data slide number display issues with proper mapping
- Add sections and notes information to analyze_text_formatting and get_presentation_overview
- Create comprehensive integration tests for all new functionality
- Update ContentExtractor with sections and notes extraction methods
- Enhance SlideQueryEngine with notes filtering and improved validation
- Add debug logging for slide number mapping in table extraction
- Update TextFormattingAnalyzer and PresentationAnalyzer to include structural information
- Maintain backward compatibility while adding new features

All tasks from the PowerPoint MCP bug fixes specification have been completed.
</commit_message>
<xml_diff>
--- a/tests/test_files/test_formatting_comprehensive.pptx
+++ b/tests/test_files/test_formatting_comprehensive.pptx
@@ -5,14 +5,16 @@
     <p:sldMasterId id="2147483648" r:id="rId1"/>
   </p:sldMasterIdLst>
   <p:sldIdLst>
-    <p:sldId id="256" r:id="rId7"/>
-    <p:sldId id="257" r:id="rId8"/>
-    <p:sldId id="258" r:id="rId9"/>
-    <p:sldId id="259" r:id="rId10"/>
-    <p:sldId id="260" r:id="rId11"/>
-    <p:sldId id="261" r:id="rId12"/>
-    <p:sldId id="262" r:id="rId13"/>
-    <p:sldId id="263" r:id="rId14"/>
+    <p:sldId id="256" r:id="rId2"/>
+    <p:sldId id="257" r:id="rId3"/>
+    <p:sldId id="258" r:id="rId4"/>
+    <p:sldId id="259" r:id="rId5"/>
+    <p:sldId id="260" r:id="rId6"/>
+    <p:sldId id="261" r:id="rId7"/>
+    <p:sldId id="262" r:id="rId8"/>
+    <p:sldId id="263" r:id="rId9"/>
+    <p:sldId id="264" r:id="rId10"/>
+    <p:sldId id="265" r:id="rId11"/>
   </p:sldIdLst>
   <p:sldSz cx="9144000" cy="6858000" type="screen4x3"/>
   <p:notesSz cx="6858000" cy="9144000"/>
@@ -111,6 +113,48 @@
       </a:defRPr>
     </a:lvl9pPr>
   </p:defaultTextStyle>
+  <p:extLst>
+    <p:ext uri="{521415D9-36F7-43E2-AB2F-B90AF26B5E84}">
+      <p14:sectionLst xmlns:p14="http://schemas.microsoft.com/office/powerpoint/2010/main">
+        <p14:section name="既定のセクション" id="{234B15FF-ED84-4EF1-8C07-A333BE2779FC}">
+          <p14:sldIdLst>
+            <p14:sldId id="256"/>
+            <p14:sldId id="257"/>
+            <p14:sldId id="258"/>
+            <p14:sldId id="259"/>
+            <p14:sldId id="260"/>
+            <p14:sldId id="261"/>
+            <p14:sldId id="262"/>
+          </p14:sldIdLst>
+        </p14:section>
+        <p14:section name="highlighted_section" id="{22F9322E-043E-490B-AFDB-FFD7E64DEDFF}">
+          <p14:sldIdLst>
+            <p14:sldId id="263"/>
+            <p14:sldId id="264"/>
+          </p14:sldIdLst>
+        </p14:section>
+        <p14:section name="this is table section" id="{CE21AA40-69BB-454F-874D-E803C0BB72C9}">
+          <p14:sldIdLst>
+            <p14:sldId id="265"/>
+          </p14:sldIdLst>
+        </p14:section>
+      </p14:sectionLst>
+    </p:ext>
+    <p:ext uri="{EFAFB233-063F-42B5-8137-9DF3F51BA10A}">
+      <p15:sldGuideLst xmlns:p15="http://schemas.microsoft.com/office/powerpoint/2012/main">
+        <p15:guide id="1" orient="horz" pos="2160">
+          <p15:clr>
+            <a:srgbClr val="A4A3A4"/>
+          </p15:clr>
+        </p15:guide>
+        <p15:guide id="2" pos="2880">
+          <p15:clr>
+            <a:srgbClr val="A4A3A4"/>
+          </p15:clr>
+        </p15:guide>
+      </p15:sldGuideLst>
+    </p:ext>
+  </p:extLst>
 </p:presentation>
 </file>
 
@@ -152,10 +196,9 @@
           <a:lstStyle/>
           <a:p>
             <a:r>
-              <a:rPr lang="en-US" smtClean="0"/>
+              <a:rPr lang="en-US"/>
               <a:t>Click to edit Master title style</a:t>
             </a:r>
-            <a:endParaRPr lang="en-US"/>
           </a:p>
         </p:txBody>
       </p:sp>
@@ -271,10 +314,9 @@
           </a:lstStyle>
           <a:p>
             <a:r>
-              <a:rPr lang="en-US" smtClean="0"/>
+              <a:rPr lang="en-US"/>
               <a:t>Click to edit Master subtitle style</a:t>
             </a:r>
-            <a:endParaRPr lang="en-US"/>
           </a:p>
         </p:txBody>
       </p:sp>
@@ -295,7 +337,7 @@
           <a:p>
             <a:fld id="{5BCAD085-E8A6-8845-BD4E-CB4CCA059FC4}" type="datetimeFigureOut">
               <a:rPr lang="en-US" smtClean="0"/>
-              <a:t>1/27/13</a:t>
+              <a:t>9/4/2025</a:t>
             </a:fld>
             <a:endParaRPr lang="en-US"/>
           </a:p>
@@ -389,10 +431,9 @@
           <a:lstStyle/>
           <a:p>
             <a:r>
-              <a:rPr lang="en-US" smtClean="0"/>
+              <a:rPr lang="en-US"/>
               <a:t>Click to edit Master title style</a:t>
             </a:r>
-            <a:endParaRPr lang="en-US"/>
           </a:p>
         </p:txBody>
       </p:sp>
@@ -413,38 +454,37 @@
           <a:p>
             <a:pPr lvl="0"/>
             <a:r>
-              <a:rPr lang="en-US" smtClean="0"/>
+              <a:rPr lang="en-US"/>
               <a:t>Click to edit Master text styles</a:t>
             </a:r>
           </a:p>
           <a:p>
             <a:pPr lvl="1"/>
             <a:r>
-              <a:rPr lang="en-US" smtClean="0"/>
+              <a:rPr lang="en-US"/>
               <a:t>Second level</a:t>
             </a:r>
           </a:p>
           <a:p>
             <a:pPr lvl="2"/>
             <a:r>
-              <a:rPr lang="en-US" smtClean="0"/>
+              <a:rPr lang="en-US"/>
               <a:t>Third level</a:t>
             </a:r>
           </a:p>
           <a:p>
             <a:pPr lvl="3"/>
             <a:r>
-              <a:rPr lang="en-US" smtClean="0"/>
+              <a:rPr lang="en-US"/>
               <a:t>Fourth level</a:t>
             </a:r>
           </a:p>
           <a:p>
             <a:pPr lvl="4"/>
             <a:r>
-              <a:rPr lang="en-US" smtClean="0"/>
+              <a:rPr lang="en-US"/>
               <a:t>Fifth level</a:t>
             </a:r>
-            <a:endParaRPr lang="en-US"/>
           </a:p>
         </p:txBody>
       </p:sp>
@@ -465,7 +505,7 @@
           <a:p>
             <a:fld id="{5BCAD085-E8A6-8845-BD4E-CB4CCA059FC4}" type="datetimeFigureOut">
               <a:rPr lang="en-US" smtClean="0"/>
-              <a:t>1/27/13</a:t>
+              <a:t>9/4/2025</a:t>
             </a:fld>
             <a:endParaRPr lang="en-US"/>
           </a:p>
@@ -564,10 +604,9 @@
           <a:lstStyle/>
           <a:p>
             <a:r>
-              <a:rPr lang="en-US" smtClean="0"/>
+              <a:rPr lang="en-US"/>
               <a:t>Click to edit Master title style</a:t>
             </a:r>
-            <a:endParaRPr lang="en-US"/>
           </a:p>
         </p:txBody>
       </p:sp>
@@ -593,38 +632,37 @@
           <a:p>
             <a:pPr lvl="0"/>
             <a:r>
-              <a:rPr lang="en-US" smtClean="0"/>
+              <a:rPr lang="en-US"/>
               <a:t>Click to edit Master text styles</a:t>
             </a:r>
           </a:p>
           <a:p>
             <a:pPr lvl="1"/>
             <a:r>
-              <a:rPr lang="en-US" smtClean="0"/>
+              <a:rPr lang="en-US"/>
               <a:t>Second level</a:t>
             </a:r>
           </a:p>
           <a:p>
             <a:pPr lvl="2"/>
             <a:r>
-              <a:rPr lang="en-US" smtClean="0"/>
+              <a:rPr lang="en-US"/>
               <a:t>Third level</a:t>
             </a:r>
           </a:p>
           <a:p>
             <a:pPr lvl="3"/>
             <a:r>
-              <a:rPr lang="en-US" smtClean="0"/>
+              <a:rPr lang="en-US"/>
               <a:t>Fourth level</a:t>
             </a:r>
           </a:p>
           <a:p>
             <a:pPr lvl="4"/>
             <a:r>
-              <a:rPr lang="en-US" smtClean="0"/>
+              <a:rPr lang="en-US"/>
               <a:t>Fifth level</a:t>
             </a:r>
-            <a:endParaRPr lang="en-US"/>
           </a:p>
         </p:txBody>
       </p:sp>
@@ -645,7 +683,7 @@
           <a:p>
             <a:fld id="{5BCAD085-E8A6-8845-BD4E-CB4CCA059FC4}" type="datetimeFigureOut">
               <a:rPr lang="en-US" smtClean="0"/>
-              <a:t>1/27/13</a:t>
+              <a:t>9/4/2025</a:t>
             </a:fld>
             <a:endParaRPr lang="en-US"/>
           </a:p>
@@ -739,10 +777,9 @@
           <a:lstStyle/>
           <a:p>
             <a:r>
-              <a:rPr lang="en-US" smtClean="0"/>
+              <a:rPr lang="en-US"/>
               <a:t>Click to edit Master title style</a:t>
             </a:r>
-            <a:endParaRPr lang="en-US"/>
           </a:p>
         </p:txBody>
       </p:sp>
@@ -763,38 +800,37 @@
           <a:p>
             <a:pPr lvl="0"/>
             <a:r>
-              <a:rPr lang="en-US" smtClean="0"/>
+              <a:rPr lang="en-US"/>
               <a:t>Click to edit Master text styles</a:t>
             </a:r>
           </a:p>
           <a:p>
             <a:pPr lvl="1"/>
             <a:r>
-              <a:rPr lang="en-US" smtClean="0"/>
+              <a:rPr lang="en-US"/>
               <a:t>Second level</a:t>
             </a:r>
           </a:p>
           <a:p>
             <a:pPr lvl="2"/>
             <a:r>
-              <a:rPr lang="en-US" smtClean="0"/>
+              <a:rPr lang="en-US"/>
               <a:t>Third level</a:t>
             </a:r>
           </a:p>
           <a:p>
             <a:pPr lvl="3"/>
             <a:r>
-              <a:rPr lang="en-US" smtClean="0"/>
+              <a:rPr lang="en-US"/>
               <a:t>Fourth level</a:t>
             </a:r>
           </a:p>
           <a:p>
             <a:pPr lvl="4"/>
             <a:r>
-              <a:rPr lang="en-US" smtClean="0"/>
+              <a:rPr lang="en-US"/>
               <a:t>Fifth level</a:t>
             </a:r>
-            <a:endParaRPr lang="en-US"/>
           </a:p>
         </p:txBody>
       </p:sp>
@@ -815,7 +851,7 @@
           <a:p>
             <a:fld id="{5BCAD085-E8A6-8845-BD4E-CB4CCA059FC4}" type="datetimeFigureOut">
               <a:rPr lang="en-US" smtClean="0"/>
-              <a:t>1/27/13</a:t>
+              <a:t>9/4/2025</a:t>
             </a:fld>
             <a:endParaRPr lang="en-US"/>
           </a:p>
@@ -918,10 +954,9 @@
           </a:lstStyle>
           <a:p>
             <a:r>
-              <a:rPr lang="en-US" smtClean="0"/>
+              <a:rPr lang="en-US"/>
               <a:t>Click to edit Master title style</a:t>
             </a:r>
-            <a:endParaRPr lang="en-US"/>
           </a:p>
         </p:txBody>
       </p:sp>
@@ -1038,7 +1073,7 @@
           <a:p>
             <a:pPr lvl="0"/>
             <a:r>
-              <a:rPr lang="en-US" smtClean="0"/>
+              <a:rPr lang="en-US"/>
               <a:t>Click to edit Master text styles</a:t>
             </a:r>
           </a:p>
@@ -1061,7 +1096,7 @@
           <a:p>
             <a:fld id="{5BCAD085-E8A6-8845-BD4E-CB4CCA059FC4}" type="datetimeFigureOut">
               <a:rPr lang="en-US" smtClean="0"/>
-              <a:t>1/27/13</a:t>
+              <a:t>9/4/2025</a:t>
             </a:fld>
             <a:endParaRPr lang="en-US"/>
           </a:p>
@@ -1155,10 +1190,9 @@
           <a:lstStyle/>
           <a:p>
             <a:r>
-              <a:rPr lang="en-US" smtClean="0"/>
+              <a:rPr lang="en-US"/>
               <a:t>Click to edit Master title style</a:t>
             </a:r>
-            <a:endParaRPr lang="en-US"/>
           </a:p>
         </p:txBody>
       </p:sp>
@@ -1212,38 +1246,37 @@
           <a:p>
             <a:pPr lvl="0"/>
             <a:r>
-              <a:rPr lang="en-US" smtClean="0"/>
+              <a:rPr lang="en-US"/>
               <a:t>Click to edit Master text styles</a:t>
             </a:r>
           </a:p>
           <a:p>
             <a:pPr lvl="1"/>
             <a:r>
-              <a:rPr lang="en-US" smtClean="0"/>
+              <a:rPr lang="en-US"/>
               <a:t>Second level</a:t>
             </a:r>
           </a:p>
           <a:p>
             <a:pPr lvl="2"/>
             <a:r>
-              <a:rPr lang="en-US" smtClean="0"/>
+              <a:rPr lang="en-US"/>
               <a:t>Third level</a:t>
             </a:r>
           </a:p>
           <a:p>
             <a:pPr lvl="3"/>
             <a:r>
-              <a:rPr lang="en-US" smtClean="0"/>
+              <a:rPr lang="en-US"/>
               <a:t>Fourth level</a:t>
             </a:r>
           </a:p>
           <a:p>
             <a:pPr lvl="4"/>
             <a:r>
-              <a:rPr lang="en-US" smtClean="0"/>
+              <a:rPr lang="en-US"/>
               <a:t>Fifth level</a:t>
             </a:r>
-            <a:endParaRPr lang="en-US"/>
           </a:p>
         </p:txBody>
       </p:sp>
@@ -1297,38 +1330,37 @@
           <a:p>
             <a:pPr lvl="0"/>
             <a:r>
-              <a:rPr lang="en-US" smtClean="0"/>
+              <a:rPr lang="en-US"/>
               <a:t>Click to edit Master text styles</a:t>
             </a:r>
           </a:p>
           <a:p>
             <a:pPr lvl="1"/>
             <a:r>
-              <a:rPr lang="en-US" smtClean="0"/>
+              <a:rPr lang="en-US"/>
               <a:t>Second level</a:t>
             </a:r>
           </a:p>
           <a:p>
             <a:pPr lvl="2"/>
             <a:r>
-              <a:rPr lang="en-US" smtClean="0"/>
+              <a:rPr lang="en-US"/>
               <a:t>Third level</a:t>
             </a:r>
           </a:p>
           <a:p>
             <a:pPr lvl="3"/>
             <a:r>
-              <a:rPr lang="en-US" smtClean="0"/>
+              <a:rPr lang="en-US"/>
               <a:t>Fourth level</a:t>
             </a:r>
           </a:p>
           <a:p>
             <a:pPr lvl="4"/>
             <a:r>
-              <a:rPr lang="en-US" smtClean="0"/>
+              <a:rPr lang="en-US"/>
               <a:t>Fifth level</a:t>
             </a:r>
-            <a:endParaRPr lang="en-US"/>
           </a:p>
         </p:txBody>
       </p:sp>
@@ -1349,7 +1381,7 @@
           <a:p>
             <a:fld id="{5BCAD085-E8A6-8845-BD4E-CB4CCA059FC4}" type="datetimeFigureOut">
               <a:rPr lang="en-US" smtClean="0"/>
-              <a:t>1/27/13</a:t>
+              <a:t>9/4/2025</a:t>
             </a:fld>
             <a:endParaRPr lang="en-US"/>
           </a:p>
@@ -1447,10 +1479,9 @@
           </a:lstStyle>
           <a:p>
             <a:r>
-              <a:rPr lang="en-US" smtClean="0"/>
+              <a:rPr lang="en-US"/>
               <a:t>Click to edit Master title style</a:t>
             </a:r>
-            <a:endParaRPr lang="en-US"/>
           </a:p>
         </p:txBody>
       </p:sp>
@@ -1513,7 +1544,7 @@
           <a:p>
             <a:pPr lvl="0"/>
             <a:r>
-              <a:rPr lang="en-US" smtClean="0"/>
+              <a:rPr lang="en-US"/>
               <a:t>Click to edit Master text styles</a:t>
             </a:r>
           </a:p>
@@ -1569,38 +1600,37 @@
           <a:p>
             <a:pPr lvl="0"/>
             <a:r>
-              <a:rPr lang="en-US" smtClean="0"/>
+              <a:rPr lang="en-US"/>
               <a:t>Click to edit Master text styles</a:t>
             </a:r>
           </a:p>
           <a:p>
             <a:pPr lvl="1"/>
             <a:r>
-              <a:rPr lang="en-US" smtClean="0"/>
+              <a:rPr lang="en-US"/>
               <a:t>Second level</a:t>
             </a:r>
           </a:p>
           <a:p>
             <a:pPr lvl="2"/>
             <a:r>
-              <a:rPr lang="en-US" smtClean="0"/>
+              <a:rPr lang="en-US"/>
               <a:t>Third level</a:t>
             </a:r>
           </a:p>
           <a:p>
             <a:pPr lvl="3"/>
             <a:r>
-              <a:rPr lang="en-US" smtClean="0"/>
+              <a:rPr lang="en-US"/>
               <a:t>Fourth level</a:t>
             </a:r>
           </a:p>
           <a:p>
             <a:pPr lvl="4"/>
             <a:r>
-              <a:rPr lang="en-US" smtClean="0"/>
+              <a:rPr lang="en-US"/>
               <a:t>Fifth level</a:t>
             </a:r>
-            <a:endParaRPr lang="en-US"/>
           </a:p>
         </p:txBody>
       </p:sp>
@@ -1663,7 +1693,7 @@
           <a:p>
             <a:pPr lvl="0"/>
             <a:r>
-              <a:rPr lang="en-US" smtClean="0"/>
+              <a:rPr lang="en-US"/>
               <a:t>Click to edit Master text styles</a:t>
             </a:r>
           </a:p>
@@ -1719,38 +1749,37 @@
           <a:p>
             <a:pPr lvl="0"/>
             <a:r>
-              <a:rPr lang="en-US" smtClean="0"/>
+              <a:rPr lang="en-US"/>
               <a:t>Click to edit Master text styles</a:t>
             </a:r>
           </a:p>
           <a:p>
             <a:pPr lvl="1"/>
             <a:r>
-              <a:rPr lang="en-US" smtClean="0"/>
+              <a:rPr lang="en-US"/>
               <a:t>Second level</a:t>
             </a:r>
           </a:p>
           <a:p>
             <a:pPr lvl="2"/>
             <a:r>
-              <a:rPr lang="en-US" smtClean="0"/>
+              <a:rPr lang="en-US"/>
               <a:t>Third level</a:t>
             </a:r>
           </a:p>
           <a:p>
             <a:pPr lvl="3"/>
             <a:r>
-              <a:rPr lang="en-US" smtClean="0"/>
+              <a:rPr lang="en-US"/>
               <a:t>Fourth level</a:t>
             </a:r>
           </a:p>
           <a:p>
             <a:pPr lvl="4"/>
             <a:r>
-              <a:rPr lang="en-US" smtClean="0"/>
+              <a:rPr lang="en-US"/>
               <a:t>Fifth level</a:t>
             </a:r>
-            <a:endParaRPr lang="en-US"/>
           </a:p>
         </p:txBody>
       </p:sp>
@@ -1771,7 +1800,7 @@
           <a:p>
             <a:fld id="{5BCAD085-E8A6-8845-BD4E-CB4CCA059FC4}" type="datetimeFigureOut">
               <a:rPr lang="en-US" smtClean="0"/>
-              <a:t>1/27/13</a:t>
+              <a:t>9/4/2025</a:t>
             </a:fld>
             <a:endParaRPr lang="en-US"/>
           </a:p>
@@ -1865,10 +1894,9 @@
           <a:lstStyle/>
           <a:p>
             <a:r>
-              <a:rPr lang="en-US" smtClean="0"/>
+              <a:rPr lang="en-US"/>
               <a:t>Click to edit Master title style</a:t>
             </a:r>
-            <a:endParaRPr lang="en-US"/>
           </a:p>
         </p:txBody>
       </p:sp>
@@ -1889,7 +1917,7 @@
           <a:p>
             <a:fld id="{5BCAD085-E8A6-8845-BD4E-CB4CCA059FC4}" type="datetimeFigureOut">
               <a:rPr lang="en-US" smtClean="0"/>
-              <a:t>1/27/13</a:t>
+              <a:t>9/4/2025</a:t>
             </a:fld>
             <a:endParaRPr lang="en-US"/>
           </a:p>
@@ -1984,7 +2012,7 @@
           <a:p>
             <a:fld id="{5BCAD085-E8A6-8845-BD4E-CB4CCA059FC4}" type="datetimeFigureOut">
               <a:rPr lang="en-US" smtClean="0"/>
-              <a:t>1/27/13</a:t>
+              <a:t>9/4/2025</a:t>
             </a:fld>
             <a:endParaRPr lang="en-US"/>
           </a:p>
@@ -2087,10 +2115,9 @@
           </a:lstStyle>
           <a:p>
             <a:r>
-              <a:rPr lang="en-US" smtClean="0"/>
+              <a:rPr lang="en-US"/>
               <a:t>Click to edit Master title style</a:t>
             </a:r>
-            <a:endParaRPr lang="en-US"/>
           </a:p>
         </p:txBody>
       </p:sp>
@@ -2144,38 +2171,37 @@
           <a:p>
             <a:pPr lvl="0"/>
             <a:r>
-              <a:rPr lang="en-US" smtClean="0"/>
+              <a:rPr lang="en-US"/>
               <a:t>Click to edit Master text styles</a:t>
             </a:r>
           </a:p>
           <a:p>
             <a:pPr lvl="1"/>
             <a:r>
-              <a:rPr lang="en-US" smtClean="0"/>
+              <a:rPr lang="en-US"/>
               <a:t>Second level</a:t>
             </a:r>
           </a:p>
           <a:p>
             <a:pPr lvl="2"/>
             <a:r>
-              <a:rPr lang="en-US" smtClean="0"/>
+              <a:rPr lang="en-US"/>
               <a:t>Third level</a:t>
             </a:r>
           </a:p>
           <a:p>
             <a:pPr lvl="3"/>
             <a:r>
-              <a:rPr lang="en-US" smtClean="0"/>
+              <a:rPr lang="en-US"/>
               <a:t>Fourth level</a:t>
             </a:r>
           </a:p>
           <a:p>
             <a:pPr lvl="4"/>
             <a:r>
-              <a:rPr lang="en-US" smtClean="0"/>
+              <a:rPr lang="en-US"/>
               <a:t>Fifth level</a:t>
             </a:r>
-            <a:endParaRPr lang="en-US"/>
           </a:p>
         </p:txBody>
       </p:sp>
@@ -2238,7 +2264,7 @@
           <a:p>
             <a:pPr lvl="0"/>
             <a:r>
-              <a:rPr lang="en-US" smtClean="0"/>
+              <a:rPr lang="en-US"/>
               <a:t>Click to edit Master text styles</a:t>
             </a:r>
           </a:p>
@@ -2261,7 +2287,7 @@
           <a:p>
             <a:fld id="{5BCAD085-E8A6-8845-BD4E-CB4CCA059FC4}" type="datetimeFigureOut">
               <a:rPr lang="en-US" smtClean="0"/>
-              <a:t>1/27/13</a:t>
+              <a:t>9/4/2025</a:t>
             </a:fld>
             <a:endParaRPr lang="en-US"/>
           </a:p>
@@ -2364,10 +2390,9 @@
           </a:lstStyle>
           <a:p>
             <a:r>
-              <a:rPr lang="en-US" smtClean="0"/>
+              <a:rPr lang="en-US"/>
               <a:t>Click to edit Master title style</a:t>
             </a:r>
-            <a:endParaRPr lang="en-US"/>
           </a:p>
         </p:txBody>
       </p:sp>
@@ -2491,7 +2516,7 @@
           <a:p>
             <a:pPr lvl="0"/>
             <a:r>
-              <a:rPr lang="en-US" smtClean="0"/>
+              <a:rPr lang="en-US"/>
               <a:t>Click to edit Master text styles</a:t>
             </a:r>
           </a:p>
@@ -2514,7 +2539,7 @@
           <a:p>
             <a:fld id="{5BCAD085-E8A6-8845-BD4E-CB4CCA059FC4}" type="datetimeFigureOut">
               <a:rPr lang="en-US" smtClean="0"/>
-              <a:t>1/27/13</a:t>
+              <a:t>9/4/2025</a:t>
             </a:fld>
             <a:endParaRPr lang="en-US"/>
           </a:p>
@@ -2623,10 +2648,9 @@
           <a:lstStyle/>
           <a:p>
             <a:r>
-              <a:rPr lang="en-US" smtClean="0"/>
+              <a:rPr lang="en-US"/>
               <a:t>Click to edit Master title style</a:t>
             </a:r>
-            <a:endParaRPr lang="en-US"/>
           </a:p>
         </p:txBody>
       </p:sp>
@@ -2657,38 +2681,37 @@
           <a:p>
             <a:pPr lvl="0"/>
             <a:r>
-              <a:rPr lang="en-US" smtClean="0"/>
+              <a:rPr lang="en-US"/>
               <a:t>Click to edit Master text styles</a:t>
             </a:r>
           </a:p>
           <a:p>
             <a:pPr lvl="1"/>
             <a:r>
-              <a:rPr lang="en-US" smtClean="0"/>
+              <a:rPr lang="en-US"/>
               <a:t>Second level</a:t>
             </a:r>
           </a:p>
           <a:p>
             <a:pPr lvl="2"/>
             <a:r>
-              <a:rPr lang="en-US" smtClean="0"/>
+              <a:rPr lang="en-US"/>
               <a:t>Third level</a:t>
             </a:r>
           </a:p>
           <a:p>
             <a:pPr lvl="3"/>
             <a:r>
-              <a:rPr lang="en-US" smtClean="0"/>
+              <a:rPr lang="en-US"/>
               <a:t>Fourth level</a:t>
             </a:r>
           </a:p>
           <a:p>
             <a:pPr lvl="4"/>
             <a:r>
-              <a:rPr lang="en-US" smtClean="0"/>
+              <a:rPr lang="en-US"/>
               <a:t>Fifth level</a:t>
             </a:r>
-            <a:endParaRPr lang="en-US"/>
           </a:p>
         </p:txBody>
       </p:sp>
@@ -2727,7 +2750,7 @@
           <a:p>
             <a:fld id="{5BCAD085-E8A6-8845-BD4E-CB4CCA059FC4}" type="datetimeFigureOut">
               <a:rPr lang="en-US" smtClean="0"/>
-              <a:t>1/27/13</a:t>
+              <a:t>9/4/2025</a:t>
             </a:fld>
             <a:endParaRPr lang="en-US"/>
           </a:p>
@@ -3086,7 +3109,7 @@
 </file>
 
 <file path=ppt/slides/slide1.xml><?xml version="1.0" encoding="utf-8"?>
-<p:sld xmlns:a="http://schemas.openxmlformats.org/drawingml/2006/main" xmlns:p="http://schemas.openxmlformats.org/presentationml/2006/main" xmlns:r="http://schemas.openxmlformats.org/officeDocument/2006/relationships">
+<p:sld xmlns:a="http://schemas.openxmlformats.org/drawingml/2006/main" xmlns:r="http://schemas.openxmlformats.org/officeDocument/2006/relationships" xmlns:p="http://schemas.openxmlformats.org/presentationml/2006/main">
   <p:cSld>
     <p:spTree>
       <p:nvGrpSpPr>
@@ -3094,7 +3117,14 @@
         <p:cNvGrpSpPr/>
         <p:nvPr/>
       </p:nvGrpSpPr>
-      <p:grpSpPr/>
+      <p:grpSpPr>
+        <a:xfrm>
+          <a:off x="0" y="0"/>
+          <a:ext cx="0" cy="0"/>
+          <a:chOff x="0" y="0"/>
+          <a:chExt cx="0" cy="0"/>
+        </a:xfrm>
+      </p:grpSpPr>
       <p:sp>
         <p:nvSpPr>
           <p:cNvPr id="2" name="Title 1"/>
@@ -3160,8 +3190,8 @@
 </p:sld>
 </file>
 
-<file path=ppt/slides/slide2.xml><?xml version="1.0" encoding="utf-8"?>
-<p:sld xmlns:a="http://schemas.openxmlformats.org/drawingml/2006/main" xmlns:p="http://schemas.openxmlformats.org/presentationml/2006/main" xmlns:r="http://schemas.openxmlformats.org/officeDocument/2006/relationships">
+<file path=ppt/slides/slide10.xml><?xml version="1.0" encoding="utf-8"?>
+<p:sld xmlns:a="http://schemas.openxmlformats.org/drawingml/2006/main" xmlns:r="http://schemas.openxmlformats.org/officeDocument/2006/relationships" xmlns:p="http://schemas.openxmlformats.org/presentationml/2006/main">
   <p:cSld>
     <p:spTree>
       <p:nvGrpSpPr>
@@ -3169,7 +3199,347 @@
         <p:cNvGrpSpPr/>
         <p:nvPr/>
       </p:nvGrpSpPr>
-      <p:grpSpPr/>
+      <p:grpSpPr>
+        <a:xfrm>
+          <a:off x="0" y="0"/>
+          <a:ext cx="0" cy="0"/>
+          <a:chOff x="0" y="0"/>
+          <a:chExt cx="0" cy="0"/>
+        </a:xfrm>
+      </p:grpSpPr>
+      <p:sp>
+        <p:nvSpPr>
+          <p:cNvPr id="2" name="タイトル 1">
+            <a:extLst>
+              <a:ext uri="{FF2B5EF4-FFF2-40B4-BE49-F238E27FC236}">
+                <a16:creationId xmlns:a16="http://schemas.microsoft.com/office/drawing/2014/main" id="{C4904031-FFA4-E606-7E01-9533B2A28207}"/>
+              </a:ext>
+            </a:extLst>
+          </p:cNvPr>
+          <p:cNvSpPr>
+            <a:spLocks noGrp="1"/>
+          </p:cNvSpPr>
+          <p:nvPr>
+            <p:ph type="title"/>
+          </p:nvPr>
+        </p:nvSpPr>
+        <p:spPr/>
+        <p:txBody>
+          <a:bodyPr/>
+          <a:lstStyle/>
+          <a:p>
+            <a:r>
+              <a:rPr kumimoji="1" lang="en-US" altLang="ja-JP" dirty="0"/>
+              <a:t>table test slide</a:t>
+            </a:r>
+            <a:endParaRPr kumimoji="1" lang="ja-JP" altLang="en-US" dirty="0"/>
+          </a:p>
+        </p:txBody>
+      </p:sp>
+      <p:graphicFrame>
+        <p:nvGraphicFramePr>
+          <p:cNvPr id="4" name="コンテンツ プレースホルダー 3">
+            <a:extLst>
+              <a:ext uri="{FF2B5EF4-FFF2-40B4-BE49-F238E27FC236}">
+                <a16:creationId xmlns:a16="http://schemas.microsoft.com/office/drawing/2014/main" id="{94CC4423-D757-B299-AE50-73FEADC0B47B}"/>
+              </a:ext>
+            </a:extLst>
+          </p:cNvPr>
+          <p:cNvGraphicFramePr>
+            <a:graphicFrameLocks noGrp="1"/>
+          </p:cNvGraphicFramePr>
+          <p:nvPr>
+            <p:ph idx="1"/>
+            <p:extLst>
+              <p:ext uri="{D42A27DB-BD31-4B8C-83A1-F6EECF244321}">
+                <p14:modId xmlns:p14="http://schemas.microsoft.com/office/powerpoint/2010/main" val="230430397"/>
+              </p:ext>
+            </p:extLst>
+          </p:nvPr>
+        </p:nvGraphicFramePr>
+        <p:xfrm>
+          <a:off x="1676400" y="1920240"/>
+          <a:ext cx="4937760" cy="1508760"/>
+        </p:xfrm>
+        <a:graphic>
+          <a:graphicData uri="http://schemas.openxmlformats.org/drawingml/2006/table">
+            <a:tbl>
+              <a:tblPr firstRow="1" bandRow="1">
+                <a:tableStyleId>{5C22544A-7EE6-4342-B048-85BDC9FD1C3A}</a:tableStyleId>
+              </a:tblPr>
+              <a:tblGrid>
+                <a:gridCol w="1645920">
+                  <a:extLst>
+                    <a:ext uri="{9D8B030D-6E8A-4147-A177-3AD203B41FA5}">
+                      <a16:colId xmlns:a16="http://schemas.microsoft.com/office/drawing/2014/main" val="1433644907"/>
+                    </a:ext>
+                  </a:extLst>
+                </a:gridCol>
+                <a:gridCol w="1645920">
+                  <a:extLst>
+                    <a:ext uri="{9D8B030D-6E8A-4147-A177-3AD203B41FA5}">
+                      <a16:colId xmlns:a16="http://schemas.microsoft.com/office/drawing/2014/main" val="1931103551"/>
+                    </a:ext>
+                  </a:extLst>
+                </a:gridCol>
+                <a:gridCol w="1645920">
+                  <a:extLst>
+                    <a:ext uri="{9D8B030D-6E8A-4147-A177-3AD203B41FA5}">
+                      <a16:colId xmlns:a16="http://schemas.microsoft.com/office/drawing/2014/main" val="1433446633"/>
+                    </a:ext>
+                  </a:extLst>
+                </a:gridCol>
+              </a:tblGrid>
+              <a:tr h="370840">
+                <a:tc>
+                  <a:txBody>
+                    <a:bodyPr/>
+                    <a:lstStyle/>
+                    <a:p>
+                      <a:r>
+                        <a:rPr kumimoji="1" lang="en-US" altLang="ja-JP" dirty="0"/>
+                        <a:t>head1</a:t>
+                      </a:r>
+                      <a:endParaRPr kumimoji="1" lang="ja-JP" altLang="en-US" dirty="0"/>
+                    </a:p>
+                  </a:txBody>
+                  <a:tcPr/>
+                </a:tc>
+                <a:tc>
+                  <a:txBody>
+                    <a:bodyPr/>
+                    <a:lstStyle/>
+                    <a:p>
+                      <a:r>
+                        <a:rPr kumimoji="1" lang="en-US" altLang="ja-JP" dirty="0"/>
+                        <a:t>head2</a:t>
+                      </a:r>
+                      <a:endParaRPr kumimoji="1" lang="ja-JP" altLang="en-US" dirty="0"/>
+                    </a:p>
+                  </a:txBody>
+                  <a:tcPr/>
+                </a:tc>
+                <a:tc>
+                  <a:txBody>
+                    <a:bodyPr/>
+                    <a:lstStyle/>
+                    <a:p>
+                      <a:r>
+                        <a:rPr kumimoji="1" lang="en-US" altLang="ja-JP" dirty="0"/>
+                        <a:t>head3</a:t>
+                      </a:r>
+                      <a:endParaRPr kumimoji="1" lang="ja-JP" altLang="en-US" dirty="0"/>
+                    </a:p>
+                  </a:txBody>
+                  <a:tcPr/>
+                </a:tc>
+                <a:extLst>
+                  <a:ext uri="{0D108BD9-81ED-4DB2-BD59-A6C34878D82A}">
+                    <a16:rowId xmlns:a16="http://schemas.microsoft.com/office/drawing/2014/main" val="590910442"/>
+                  </a:ext>
+                </a:extLst>
+              </a:tr>
+              <a:tr h="370840">
+                <a:tc>
+                  <a:txBody>
+                    <a:bodyPr/>
+                    <a:lstStyle/>
+                    <a:p>
+                      <a:r>
+                        <a:rPr kumimoji="1" lang="en-US" altLang="ja-JP" dirty="0"/>
+                        <a:t>a1</a:t>
+                      </a:r>
+                      <a:endParaRPr kumimoji="1" lang="ja-JP" altLang="en-US" dirty="0"/>
+                    </a:p>
+                  </a:txBody>
+                  <a:tcPr/>
+                </a:tc>
+                <a:tc>
+                  <a:txBody>
+                    <a:bodyPr/>
+                    <a:lstStyle/>
+                    <a:p>
+                      <a:r>
+                        <a:rPr kumimoji="1" lang="en-US" altLang="ja-JP" dirty="0"/>
+                        <a:t>a2</a:t>
+                      </a:r>
+                      <a:endParaRPr kumimoji="1" lang="ja-JP" altLang="en-US" dirty="0"/>
+                    </a:p>
+                  </a:txBody>
+                  <a:tcPr/>
+                </a:tc>
+                <a:tc>
+                  <a:txBody>
+                    <a:bodyPr/>
+                    <a:lstStyle/>
+                    <a:p>
+                      <a:r>
+                        <a:rPr kumimoji="1" lang="en-US" altLang="ja-JP" dirty="0"/>
+                        <a:t>a3</a:t>
+                      </a:r>
+                      <a:endParaRPr kumimoji="1" lang="ja-JP" altLang="en-US" dirty="0"/>
+                    </a:p>
+                  </a:txBody>
+                  <a:tcPr/>
+                </a:tc>
+                <a:extLst>
+                  <a:ext uri="{0D108BD9-81ED-4DB2-BD59-A6C34878D82A}">
+                    <a16:rowId xmlns:a16="http://schemas.microsoft.com/office/drawing/2014/main" val="3628945661"/>
+                  </a:ext>
+                </a:extLst>
+              </a:tr>
+              <a:tr h="370840">
+                <a:tc>
+                  <a:txBody>
+                    <a:bodyPr/>
+                    <a:lstStyle/>
+                    <a:p>
+                      <a:r>
+                        <a:rPr kumimoji="1" lang="en-US" altLang="ja-JP" dirty="0"/>
+                        <a:t>b1</a:t>
+                      </a:r>
+                      <a:endParaRPr kumimoji="1" lang="ja-JP" altLang="en-US" dirty="0"/>
+                    </a:p>
+                  </a:txBody>
+                  <a:tcPr/>
+                </a:tc>
+                <a:tc>
+                  <a:txBody>
+                    <a:bodyPr/>
+                    <a:lstStyle/>
+                    <a:p>
+                      <a:r>
+                        <a:rPr kumimoji="1" lang="en-US" altLang="ja-JP" dirty="0"/>
+                        <a:t>b2</a:t>
+                      </a:r>
+                      <a:endParaRPr kumimoji="1" lang="ja-JP" altLang="en-US" dirty="0"/>
+                    </a:p>
+                  </a:txBody>
+                  <a:tcPr/>
+                </a:tc>
+                <a:tc>
+                  <a:txBody>
+                    <a:bodyPr/>
+                    <a:lstStyle/>
+                    <a:p>
+                      <a:r>
+                        <a:rPr kumimoji="1" lang="en-US" altLang="ja-JP" dirty="0"/>
+                        <a:t>b3</a:t>
+                      </a:r>
+                      <a:endParaRPr kumimoji="1" lang="ja-JP" altLang="en-US" dirty="0"/>
+                    </a:p>
+                  </a:txBody>
+                  <a:tcPr/>
+                </a:tc>
+                <a:extLst>
+                  <a:ext uri="{0D108BD9-81ED-4DB2-BD59-A6C34878D82A}">
+                    <a16:rowId xmlns:a16="http://schemas.microsoft.com/office/drawing/2014/main" val="1341397582"/>
+                  </a:ext>
+                </a:extLst>
+              </a:tr>
+              <a:tr h="370840">
+                <a:tc>
+                  <a:txBody>
+                    <a:bodyPr/>
+                    <a:lstStyle/>
+                    <a:p>
+                      <a:r>
+                        <a:rPr kumimoji="1" lang="en-US" altLang="ja-JP" sz="2000" b="1" i="1" dirty="0">
+                          <a:solidFill>
+                            <a:srgbClr val="FF0000"/>
+                          </a:solidFill>
+                        </a:rPr>
+                        <a:t>C1</a:t>
+                      </a:r>
+                      <a:endParaRPr kumimoji="1" lang="ja-JP" altLang="en-US" sz="2000" b="1" i="1" dirty="0">
+                        <a:solidFill>
+                          <a:srgbClr val="FF0000"/>
+                        </a:solidFill>
+                      </a:endParaRPr>
+                    </a:p>
+                  </a:txBody>
+                  <a:tcPr/>
+                </a:tc>
+                <a:tc>
+                  <a:txBody>
+                    <a:bodyPr/>
+                    <a:lstStyle/>
+                    <a:p>
+                      <a:r>
+                        <a:rPr kumimoji="1" lang="en-US" altLang="ja-JP" sz="2000" b="1" i="1" strike="sngStrike" dirty="0"/>
+                        <a:t>C2</a:t>
+                      </a:r>
+                      <a:endParaRPr kumimoji="1" lang="ja-JP" altLang="en-US" sz="2000" b="1" i="1" strike="sngStrike" dirty="0"/>
+                    </a:p>
+                  </a:txBody>
+                  <a:tcPr>
+                    <a:solidFill>
+                      <a:srgbClr val="FF0000"/>
+                    </a:solidFill>
+                  </a:tcPr>
+                </a:tc>
+                <a:tc>
+                  <a:txBody>
+                    <a:bodyPr/>
+                    <a:lstStyle/>
+                    <a:p>
+                      <a:r>
+                        <a:rPr kumimoji="1" lang="en-US" altLang="ja-JP" sz="2000" b="1" i="1" dirty="0">
+                          <a:highlight>
+                            <a:srgbClr val="FFFF00"/>
+                          </a:highlight>
+                        </a:rPr>
+                        <a:t>C3</a:t>
+                      </a:r>
+                      <a:endParaRPr kumimoji="1" lang="ja-JP" altLang="en-US" sz="2000" b="1" i="1" dirty="0">
+                        <a:highlight>
+                          <a:srgbClr val="FFFF00"/>
+                        </a:highlight>
+                      </a:endParaRPr>
+                    </a:p>
+                  </a:txBody>
+                  <a:tcPr/>
+                </a:tc>
+                <a:extLst>
+                  <a:ext uri="{0D108BD9-81ED-4DB2-BD59-A6C34878D82A}">
+                    <a16:rowId xmlns:a16="http://schemas.microsoft.com/office/drawing/2014/main" val="3306636690"/>
+                  </a:ext>
+                </a:extLst>
+              </a:tr>
+            </a:tbl>
+          </a:graphicData>
+        </a:graphic>
+      </p:graphicFrame>
+    </p:spTree>
+    <p:extLst>
+      <p:ext uri="{BB962C8B-B14F-4D97-AF65-F5344CB8AC3E}">
+        <p14:creationId xmlns:p14="http://schemas.microsoft.com/office/powerpoint/2010/main" val="1907145432"/>
+      </p:ext>
+    </p:extLst>
+  </p:cSld>
+  <p:clrMapOvr>
+    <a:masterClrMapping/>
+  </p:clrMapOvr>
+</p:sld>
+</file>
+
+<file path=ppt/slides/slide2.xml><?xml version="1.0" encoding="utf-8"?>
+<p:sld xmlns:a="http://schemas.openxmlformats.org/drawingml/2006/main" xmlns:r="http://schemas.openxmlformats.org/officeDocument/2006/relationships" xmlns:p="http://schemas.openxmlformats.org/presentationml/2006/main">
+  <p:cSld>
+    <p:spTree>
+      <p:nvGrpSpPr>
+        <p:cNvPr id="1" name=""/>
+        <p:cNvGrpSpPr/>
+        <p:nvPr/>
+      </p:nvGrpSpPr>
+      <p:grpSpPr>
+        <a:xfrm>
+          <a:off x="0" y="0"/>
+          <a:ext cx="0" cy="0"/>
+          <a:chOff x="0" y="0"/>
+          <a:chExt cx="0" cy="0"/>
+        </a:xfrm>
+      </p:grpSpPr>
       <p:sp>
         <p:nvSpPr>
           <p:cNvPr id="2" name="Title 1"/>
@@ -3228,7 +3598,7 @@
 </file>
 
 <file path=ppt/slides/slide3.xml><?xml version="1.0" encoding="utf-8"?>
-<p:sld xmlns:a="http://schemas.openxmlformats.org/drawingml/2006/main" xmlns:p="http://schemas.openxmlformats.org/presentationml/2006/main" xmlns:r="http://schemas.openxmlformats.org/officeDocument/2006/relationships">
+<p:sld xmlns:a="http://schemas.openxmlformats.org/drawingml/2006/main" xmlns:r="http://schemas.openxmlformats.org/officeDocument/2006/relationships" xmlns:p="http://schemas.openxmlformats.org/presentationml/2006/main">
   <p:cSld>
     <p:spTree>
       <p:nvGrpSpPr>
@@ -3236,7 +3606,14 @@
         <p:cNvGrpSpPr/>
         <p:nvPr/>
       </p:nvGrpSpPr>
-      <p:grpSpPr/>
+      <p:grpSpPr>
+        <a:xfrm>
+          <a:off x="0" y="0"/>
+          <a:ext cx="0" cy="0"/>
+          <a:chOff x="0" y="0"/>
+          <a:chExt cx="0" cy="0"/>
+        </a:xfrm>
+      </p:grpSpPr>
       <p:sp>
         <p:nvSpPr>
           <p:cNvPr id="2" name="Title 1"/>
@@ -3295,7 +3672,7 @@
 </file>
 
 <file path=ppt/slides/slide4.xml><?xml version="1.0" encoding="utf-8"?>
-<p:sld xmlns:a="http://schemas.openxmlformats.org/drawingml/2006/main" xmlns:p="http://schemas.openxmlformats.org/presentationml/2006/main" xmlns:r="http://schemas.openxmlformats.org/officeDocument/2006/relationships">
+<p:sld xmlns:a="http://schemas.openxmlformats.org/drawingml/2006/main" xmlns:r="http://schemas.openxmlformats.org/officeDocument/2006/relationships" xmlns:p="http://schemas.openxmlformats.org/presentationml/2006/main">
   <p:cSld>
     <p:spTree>
       <p:nvGrpSpPr>
@@ -3303,7 +3680,14 @@
         <p:cNvGrpSpPr/>
         <p:nvPr/>
       </p:nvGrpSpPr>
-      <p:grpSpPr/>
+      <p:grpSpPr>
+        <a:xfrm>
+          <a:off x="0" y="0"/>
+          <a:ext cx="0" cy="0"/>
+          <a:chOff x="0" y="0"/>
+          <a:chExt cx="0" cy="0"/>
+        </a:xfrm>
+      </p:grpSpPr>
       <p:sp>
         <p:nvSpPr>
           <p:cNvPr id="2" name="Title 1"/>
@@ -3362,7 +3746,7 @@
 </file>
 
 <file path=ppt/slides/slide5.xml><?xml version="1.0" encoding="utf-8"?>
-<p:sld xmlns:a="http://schemas.openxmlformats.org/drawingml/2006/main" xmlns:p="http://schemas.openxmlformats.org/presentationml/2006/main" xmlns:r="http://schemas.openxmlformats.org/officeDocument/2006/relationships">
+<p:sld xmlns:a="http://schemas.openxmlformats.org/drawingml/2006/main" xmlns:r="http://schemas.openxmlformats.org/officeDocument/2006/relationships" xmlns:p="http://schemas.openxmlformats.org/presentationml/2006/main">
   <p:cSld>
     <p:spTree>
       <p:nvGrpSpPr>
@@ -3370,7 +3754,14 @@
         <p:cNvGrpSpPr/>
         <p:nvPr/>
       </p:nvGrpSpPr>
-      <p:grpSpPr/>
+      <p:grpSpPr>
+        <a:xfrm>
+          <a:off x="0" y="0"/>
+          <a:ext cx="0" cy="0"/>
+          <a:chOff x="0" y="0"/>
+          <a:chExt cx="0" cy="0"/>
+        </a:xfrm>
+      </p:grpSpPr>
       <p:sp>
         <p:nvSpPr>
           <p:cNvPr id="2" name="Title 1"/>
@@ -3408,13 +3799,7 @@
           <a:lstStyle/>
           <a:p>
             <a:r>
-              <a:t>Visit </a:t>
-            </a:r>
-            <a:r>
-              <a:t>our website</a:t>
-            </a:r>
-            <a:r>
-              <a:t> for more information.</a:t>
+              <a:t>Visit our website for more information.</a:t>
             </a:r>
           </a:p>
         </p:txBody>
@@ -3428,7 +3813,7 @@
 </file>
 
 <file path=ppt/slides/slide6.xml><?xml version="1.0" encoding="utf-8"?>
-<p:sld xmlns:a="http://schemas.openxmlformats.org/drawingml/2006/main" xmlns:p="http://schemas.openxmlformats.org/presentationml/2006/main" xmlns:r="http://schemas.openxmlformats.org/officeDocument/2006/relationships">
+<p:sld xmlns:a="http://schemas.openxmlformats.org/drawingml/2006/main" xmlns:r="http://schemas.openxmlformats.org/officeDocument/2006/relationships" xmlns:p="http://schemas.openxmlformats.org/presentationml/2006/main">
   <p:cSld>
     <p:spTree>
       <p:nvGrpSpPr>
@@ -3436,7 +3821,14 @@
         <p:cNvGrpSpPr/>
         <p:nvPr/>
       </p:nvGrpSpPr>
-      <p:grpSpPr/>
+      <p:grpSpPr>
+        <a:xfrm>
+          <a:off x="0" y="0"/>
+          <a:ext cx="0" cy="0"/>
+          <a:chOff x="0" y="0"/>
+          <a:chExt cx="0" cy="0"/>
+        </a:xfrm>
+      </p:grpSpPr>
       <p:sp>
         <p:nvSpPr>
           <p:cNvPr id="2" name="Title 1"/>
@@ -3497,7 +3889,7 @@
 </file>
 
 <file path=ppt/slides/slide7.xml><?xml version="1.0" encoding="utf-8"?>
-<p:sld xmlns:a="http://schemas.openxmlformats.org/drawingml/2006/main" xmlns:p="http://schemas.openxmlformats.org/presentationml/2006/main" xmlns:r="http://schemas.openxmlformats.org/officeDocument/2006/relationships">
+<p:sld xmlns:a="http://schemas.openxmlformats.org/drawingml/2006/main" xmlns:r="http://schemas.openxmlformats.org/officeDocument/2006/relationships" xmlns:p="http://schemas.openxmlformats.org/presentationml/2006/main">
   <p:cSld>
     <p:spTree>
       <p:nvGrpSpPr>
@@ -3505,7 +3897,14 @@
         <p:cNvGrpSpPr/>
         <p:nvPr/>
       </p:nvGrpSpPr>
-      <p:grpSpPr/>
+      <p:grpSpPr>
+        <a:xfrm>
+          <a:off x="0" y="0"/>
+          <a:ext cx="0" cy="0"/>
+          <a:chOff x="0" y="0"/>
+          <a:chExt cx="0" cy="0"/>
+        </a:xfrm>
+      </p:grpSpPr>
       <p:sp>
         <p:nvSpPr>
           <p:cNvPr id="2" name="Title 1"/>
@@ -3578,7 +3977,7 @@
 </file>
 
 <file path=ppt/slides/slide8.xml><?xml version="1.0" encoding="utf-8"?>
-<p:sld xmlns:a="http://schemas.openxmlformats.org/drawingml/2006/main" xmlns:p="http://schemas.openxmlformats.org/presentationml/2006/main" xmlns:r="http://schemas.openxmlformats.org/officeDocument/2006/relationships">
+<p:sld xmlns:a="http://schemas.openxmlformats.org/drawingml/2006/main" xmlns:r="http://schemas.openxmlformats.org/officeDocument/2006/relationships" xmlns:p="http://schemas.openxmlformats.org/presentationml/2006/main">
   <p:cSld>
     <p:spTree>
       <p:nvGrpSpPr>
@@ -3586,8 +3985,223 @@
         <p:cNvGrpSpPr/>
         <p:nvPr/>
       </p:nvGrpSpPr>
-      <p:grpSpPr/>
+      <p:grpSpPr>
+        <a:xfrm>
+          <a:off x="0" y="0"/>
+          <a:ext cx="0" cy="0"/>
+          <a:chOff x="0" y="0"/>
+          <a:chExt cx="0" cy="0"/>
+        </a:xfrm>
+      </p:grpSpPr>
+      <p:sp>
+        <p:nvSpPr>
+          <p:cNvPr id="2" name="タイトル 1">
+            <a:extLst>
+              <a:ext uri="{FF2B5EF4-FFF2-40B4-BE49-F238E27FC236}">
+                <a16:creationId xmlns:a16="http://schemas.microsoft.com/office/drawing/2014/main" id="{86B9C3D4-4E2B-6A66-F3E8-90CB76B896F7}"/>
+              </a:ext>
+            </a:extLst>
+          </p:cNvPr>
+          <p:cNvSpPr>
+            <a:spLocks noGrp="1"/>
+          </p:cNvSpPr>
+          <p:nvPr>
+            <p:ph type="title"/>
+          </p:nvPr>
+        </p:nvSpPr>
+        <p:spPr/>
+        <p:txBody>
+          <a:bodyPr/>
+          <a:lstStyle/>
+          <a:p>
+            <a:r>
+              <a:rPr lang="en-US" altLang="ja-JP" dirty="0"/>
+              <a:t>highlighted text test slides </a:t>
+            </a:r>
+            <a:endParaRPr lang="ja-JP" altLang="en-US" dirty="0"/>
+          </a:p>
+        </p:txBody>
+      </p:sp>
+      <p:sp>
+        <p:nvSpPr>
+          <p:cNvPr id="3" name="コンテンツ プレースホルダー 2">
+            <a:extLst>
+              <a:ext uri="{FF2B5EF4-FFF2-40B4-BE49-F238E27FC236}">
+                <a16:creationId xmlns:a16="http://schemas.microsoft.com/office/drawing/2014/main" id="{5BD53647-4E47-D351-95F7-B2209DBF015D}"/>
+              </a:ext>
+            </a:extLst>
+          </p:cNvPr>
+          <p:cNvSpPr>
+            <a:spLocks noGrp="1"/>
+          </p:cNvSpPr>
+          <p:nvPr>
+            <p:ph idx="1"/>
+          </p:nvPr>
+        </p:nvSpPr>
+        <p:spPr/>
+        <p:txBody>
+          <a:bodyPr/>
+          <a:lstStyle/>
+          <a:p>
+            <a:r>
+              <a:rPr lang="en-US" altLang="ja-JP" dirty="0"/>
+              <a:t>this is </a:t>
+            </a:r>
+            <a:r>
+              <a:rPr lang="en-US" altLang="ja-JP" dirty="0">
+                <a:highlight>
+                  <a:srgbClr val="FFFF00"/>
+                </a:highlight>
+              </a:rPr>
+              <a:t>Highlighted</a:t>
+            </a:r>
+            <a:r>
+              <a:rPr lang="en-US" altLang="ja-JP" dirty="0"/>
+              <a:t> text.</a:t>
+            </a:r>
+          </a:p>
+          <a:p>
+            <a:endParaRPr lang="en-US" altLang="ja-JP" dirty="0"/>
+          </a:p>
+          <a:p>
+            <a:r>
+              <a:rPr lang="en-US" altLang="ja-JP" dirty="0"/>
+              <a:t>this is </a:t>
+            </a:r>
+            <a:r>
+              <a:rPr lang="en-US" altLang="ja-JP" dirty="0">
+                <a:highlight>
+                  <a:srgbClr val="000080"/>
+                </a:highlight>
+              </a:rPr>
+              <a:t>Highlighted</a:t>
+            </a:r>
+            <a:r>
+              <a:rPr lang="en-US" altLang="ja-JP" dirty="0"/>
+              <a:t> text too.</a:t>
+            </a:r>
+          </a:p>
+          <a:p>
+            <a:endParaRPr lang="ja-JP" altLang="en-US" dirty="0"/>
+          </a:p>
+        </p:txBody>
+      </p:sp>
     </p:spTree>
+  </p:cSld>
+  <p:clrMapOvr>
+    <a:masterClrMapping/>
+  </p:clrMapOvr>
+</p:sld>
+</file>
+
+<file path=ppt/slides/slide9.xml><?xml version="1.0" encoding="utf-8"?>
+<p:sld xmlns:a="http://schemas.openxmlformats.org/drawingml/2006/main" xmlns:r="http://schemas.openxmlformats.org/officeDocument/2006/relationships" xmlns:p="http://schemas.openxmlformats.org/presentationml/2006/main">
+  <p:cSld>
+    <p:spTree>
+      <p:nvGrpSpPr>
+        <p:cNvPr id="1" name=""/>
+        <p:cNvGrpSpPr/>
+        <p:nvPr/>
+      </p:nvGrpSpPr>
+      <p:grpSpPr>
+        <a:xfrm>
+          <a:off x="0" y="0"/>
+          <a:ext cx="0" cy="0"/>
+          <a:chOff x="0" y="0"/>
+          <a:chExt cx="0" cy="0"/>
+        </a:xfrm>
+      </p:grpSpPr>
+      <p:sp>
+        <p:nvSpPr>
+          <p:cNvPr id="2" name="タイトル 1">
+            <a:extLst>
+              <a:ext uri="{FF2B5EF4-FFF2-40B4-BE49-F238E27FC236}">
+                <a16:creationId xmlns:a16="http://schemas.microsoft.com/office/drawing/2014/main" id="{60099EFC-C32C-BF76-F1DC-AFA26DC68B77}"/>
+              </a:ext>
+            </a:extLst>
+          </p:cNvPr>
+          <p:cNvSpPr>
+            <a:spLocks noGrp="1"/>
+          </p:cNvSpPr>
+          <p:nvPr>
+            <p:ph type="title"/>
+          </p:nvPr>
+        </p:nvSpPr>
+        <p:spPr/>
+        <p:txBody>
+          <a:bodyPr/>
+          <a:lstStyle/>
+          <a:p>
+            <a:r>
+              <a:rPr kumimoji="1" lang="en-US" altLang="ja-JP" dirty="0"/>
+              <a:t>strikethrough test slide</a:t>
+            </a:r>
+            <a:endParaRPr kumimoji="1" lang="ja-JP" altLang="en-US" dirty="0"/>
+          </a:p>
+        </p:txBody>
+      </p:sp>
+      <p:sp>
+        <p:nvSpPr>
+          <p:cNvPr id="3" name="コンテンツ プレースホルダー 2">
+            <a:extLst>
+              <a:ext uri="{FF2B5EF4-FFF2-40B4-BE49-F238E27FC236}">
+                <a16:creationId xmlns:a16="http://schemas.microsoft.com/office/drawing/2014/main" id="{21072A46-F940-4873-4385-38CD32FD3521}"/>
+              </a:ext>
+            </a:extLst>
+          </p:cNvPr>
+          <p:cNvSpPr>
+            <a:spLocks noGrp="1"/>
+          </p:cNvSpPr>
+          <p:nvPr>
+            <p:ph idx="1"/>
+          </p:nvPr>
+        </p:nvSpPr>
+        <p:spPr/>
+        <p:txBody>
+          <a:bodyPr/>
+          <a:lstStyle/>
+          <a:p>
+            <a:r>
+              <a:rPr kumimoji="1" lang="af-ZA" altLang="ja-JP" dirty="0"/>
+              <a:t>this is a </a:t>
+            </a:r>
+            <a:r>
+              <a:rPr kumimoji="1" lang="af-ZA" altLang="ja-JP" strike="sngStrike" dirty="0"/>
+              <a:t>strikethroughed</a:t>
+            </a:r>
+            <a:r>
+              <a:rPr kumimoji="1" lang="af-ZA" altLang="ja-JP" dirty="0"/>
+              <a:t> text.</a:t>
+            </a:r>
+          </a:p>
+          <a:p>
+            <a:endParaRPr kumimoji="1" lang="en-US" altLang="ja-JP" dirty="0"/>
+          </a:p>
+          <a:p>
+            <a:r>
+              <a:rPr kumimoji="1" lang="af-ZA" altLang="ja-JP" dirty="0"/>
+              <a:t>this is a </a:t>
+            </a:r>
+            <a:r>
+              <a:rPr kumimoji="1" lang="af-ZA" altLang="ja-JP" strike="sngStrike" dirty="0"/>
+              <a:t>strikethroughed</a:t>
+            </a:r>
+            <a:r>
+              <a:rPr kumimoji="1" lang="af-ZA" altLang="ja-JP" dirty="0"/>
+              <a:t> text,too.</a:t>
+            </a:r>
+          </a:p>
+          <a:p>
+            <a:endParaRPr kumimoji="1" lang="ja-JP" altLang="en-US" dirty="0"/>
+          </a:p>
+        </p:txBody>
+      </p:sp>
+    </p:spTree>
+    <p:extLst>
+      <p:ext uri="{BB962C8B-B14F-4D97-AF65-F5344CB8AC3E}">
+        <p14:creationId xmlns:p14="http://schemas.microsoft.com/office/powerpoint/2010/main" val="4072312156"/>
+      </p:ext>
+    </p:extLst>
   </p:cSld>
   <p:clrMapOvr>
     <a:masterClrMapping/>

</xml_diff>

<commit_message>
slide_numbers now supports Python-style slicing notation.
</commit_message>
<xml_diff>
--- a/tests/test_files/test_formatting_comprehensive.pptx
+++ b/tests/test_files/test_formatting_comprehensive.pptx
@@ -15,6 +15,9 @@
     <p:sldId id="263" r:id="rId9"/>
     <p:sldId id="264" r:id="rId10"/>
     <p:sldId id="265" r:id="rId11"/>
+    <p:sldId id="266" r:id="rId12"/>
+    <p:sldId id="268" r:id="rId13"/>
+    <p:sldId id="269" r:id="rId14"/>
   </p:sldIdLst>
   <p:sldSz cx="9144000" cy="6858000" type="screen4x3"/>
   <p:notesSz cx="6858000" cy="9144000"/>
@@ -119,9 +122,17 @@
         <p14:section name="既定のセクション" id="{234B15FF-ED84-4EF1-8C07-A333BE2779FC}">
           <p14:sldIdLst>
             <p14:sldId id="256"/>
+          </p14:sldIdLst>
+        </p14:section>
+        <p14:section name="セクション①" id="{63514C02-4EE5-4C57-A5F8-8882DB57A504}">
+          <p14:sldIdLst>
             <p14:sldId id="257"/>
             <p14:sldId id="258"/>
             <p14:sldId id="259"/>
+          </p14:sldIdLst>
+        </p14:section>
+        <p14:section name="セクション②" id="{9B43267F-A7AF-4451-BD95-6682E022F294}">
+          <p14:sldIdLst>
             <p14:sldId id="260"/>
             <p14:sldId id="261"/>
             <p14:sldId id="262"/>
@@ -136,6 +147,9 @@
         <p14:section name="this is table section" id="{CE21AA40-69BB-454F-874D-E803C0BB72C9}">
           <p14:sldIdLst>
             <p14:sldId id="265"/>
+            <p14:sldId id="266"/>
+            <p14:sldId id="268"/>
+            <p14:sldId id="269"/>
           </p14:sldIdLst>
         </p14:section>
       </p14:sectionLst>
@@ -337,7 +351,7 @@
           <a:p>
             <a:fld id="{5BCAD085-E8A6-8845-BD4E-CB4CCA059FC4}" type="datetimeFigureOut">
               <a:rPr lang="en-US" smtClean="0"/>
-              <a:t>9/4/2025</a:t>
+              <a:t>1/9/2026</a:t>
             </a:fld>
             <a:endParaRPr lang="en-US"/>
           </a:p>
@@ -505,7 +519,7 @@
           <a:p>
             <a:fld id="{5BCAD085-E8A6-8845-BD4E-CB4CCA059FC4}" type="datetimeFigureOut">
               <a:rPr lang="en-US" smtClean="0"/>
-              <a:t>9/4/2025</a:t>
+              <a:t>1/9/2026</a:t>
             </a:fld>
             <a:endParaRPr lang="en-US"/>
           </a:p>
@@ -683,7 +697,7 @@
           <a:p>
             <a:fld id="{5BCAD085-E8A6-8845-BD4E-CB4CCA059FC4}" type="datetimeFigureOut">
               <a:rPr lang="en-US" smtClean="0"/>
-              <a:t>9/4/2025</a:t>
+              <a:t>1/9/2026</a:t>
             </a:fld>
             <a:endParaRPr lang="en-US"/>
           </a:p>
@@ -851,7 +865,7 @@
           <a:p>
             <a:fld id="{5BCAD085-E8A6-8845-BD4E-CB4CCA059FC4}" type="datetimeFigureOut">
               <a:rPr lang="en-US" smtClean="0"/>
-              <a:t>9/4/2025</a:t>
+              <a:t>1/9/2026</a:t>
             </a:fld>
             <a:endParaRPr lang="en-US"/>
           </a:p>
@@ -1096,7 +1110,7 @@
           <a:p>
             <a:fld id="{5BCAD085-E8A6-8845-BD4E-CB4CCA059FC4}" type="datetimeFigureOut">
               <a:rPr lang="en-US" smtClean="0"/>
-              <a:t>9/4/2025</a:t>
+              <a:t>1/9/2026</a:t>
             </a:fld>
             <a:endParaRPr lang="en-US"/>
           </a:p>
@@ -1381,7 +1395,7 @@
           <a:p>
             <a:fld id="{5BCAD085-E8A6-8845-BD4E-CB4CCA059FC4}" type="datetimeFigureOut">
               <a:rPr lang="en-US" smtClean="0"/>
-              <a:t>9/4/2025</a:t>
+              <a:t>1/9/2026</a:t>
             </a:fld>
             <a:endParaRPr lang="en-US"/>
           </a:p>
@@ -1800,7 +1814,7 @@
           <a:p>
             <a:fld id="{5BCAD085-E8A6-8845-BD4E-CB4CCA059FC4}" type="datetimeFigureOut">
               <a:rPr lang="en-US" smtClean="0"/>
-              <a:t>9/4/2025</a:t>
+              <a:t>1/9/2026</a:t>
             </a:fld>
             <a:endParaRPr lang="en-US"/>
           </a:p>
@@ -1917,7 +1931,7 @@
           <a:p>
             <a:fld id="{5BCAD085-E8A6-8845-BD4E-CB4CCA059FC4}" type="datetimeFigureOut">
               <a:rPr lang="en-US" smtClean="0"/>
-              <a:t>9/4/2025</a:t>
+              <a:t>1/9/2026</a:t>
             </a:fld>
             <a:endParaRPr lang="en-US"/>
           </a:p>
@@ -2012,7 +2026,7 @@
           <a:p>
             <a:fld id="{5BCAD085-E8A6-8845-BD4E-CB4CCA059FC4}" type="datetimeFigureOut">
               <a:rPr lang="en-US" smtClean="0"/>
-              <a:t>9/4/2025</a:t>
+              <a:t>1/9/2026</a:t>
             </a:fld>
             <a:endParaRPr lang="en-US"/>
           </a:p>
@@ -2287,7 +2301,7 @@
           <a:p>
             <a:fld id="{5BCAD085-E8A6-8845-BD4E-CB4CCA059FC4}" type="datetimeFigureOut">
               <a:rPr lang="en-US" smtClean="0"/>
-              <a:t>9/4/2025</a:t>
+              <a:t>1/9/2026</a:t>
             </a:fld>
             <a:endParaRPr lang="en-US"/>
           </a:p>
@@ -2539,7 +2553,7 @@
           <a:p>
             <a:fld id="{5BCAD085-E8A6-8845-BD4E-CB4CCA059FC4}" type="datetimeFigureOut">
               <a:rPr lang="en-US" smtClean="0"/>
-              <a:t>9/4/2025</a:t>
+              <a:t>1/9/2026</a:t>
             </a:fld>
             <a:endParaRPr lang="en-US"/>
           </a:p>
@@ -2750,7 +2764,7 @@
           <a:p>
             <a:fld id="{5BCAD085-E8A6-8845-BD4E-CB4CCA059FC4}" type="datetimeFigureOut">
               <a:rPr lang="en-US" smtClean="0"/>
-              <a:t>9/4/2025</a:t>
+              <a:t>1/9/2026</a:t>
             </a:fld>
             <a:endParaRPr lang="en-US"/>
           </a:p>
@@ -3252,14 +3266,454 @@
             <p:ph idx="1"/>
             <p:extLst>
               <p:ext uri="{D42A27DB-BD31-4B8C-83A1-F6EECF244321}">
-                <p14:modId xmlns:p14="http://schemas.microsoft.com/office/powerpoint/2010/main" val="230430397"/>
+                <p14:modId xmlns:p14="http://schemas.microsoft.com/office/powerpoint/2010/main" val="3573589353"/>
               </p:ext>
             </p:extLst>
           </p:nvPr>
         </p:nvGraphicFramePr>
         <p:xfrm>
-          <a:off x="1676400" y="1920240"/>
-          <a:ext cx="4937760" cy="1508760"/>
+          <a:off x="1676399" y="1920240"/>
+          <a:ext cx="6851583" cy="1778000"/>
+        </p:xfrm>
+        <a:graphic>
+          <a:graphicData uri="http://schemas.openxmlformats.org/drawingml/2006/table">
+            <a:tbl>
+              <a:tblPr firstRow="1" bandRow="1">
+                <a:tableStyleId>{5C22544A-7EE6-4342-B048-85BDC9FD1C3A}</a:tableStyleId>
+              </a:tblPr>
+              <a:tblGrid>
+                <a:gridCol w="1092959">
+                  <a:extLst>
+                    <a:ext uri="{9D8B030D-6E8A-4147-A177-3AD203B41FA5}">
+                      <a16:colId xmlns:a16="http://schemas.microsoft.com/office/drawing/2014/main" val="1433644907"/>
+                    </a:ext>
+                  </a:extLst>
+                </a:gridCol>
+                <a:gridCol w="3474763">
+                  <a:extLst>
+                    <a:ext uri="{9D8B030D-6E8A-4147-A177-3AD203B41FA5}">
+                      <a16:colId xmlns:a16="http://schemas.microsoft.com/office/drawing/2014/main" val="1931103551"/>
+                    </a:ext>
+                  </a:extLst>
+                </a:gridCol>
+                <a:gridCol w="2283861">
+                  <a:extLst>
+                    <a:ext uri="{9D8B030D-6E8A-4147-A177-3AD203B41FA5}">
+                      <a16:colId xmlns:a16="http://schemas.microsoft.com/office/drawing/2014/main" val="1433446633"/>
+                    </a:ext>
+                  </a:extLst>
+                </a:gridCol>
+              </a:tblGrid>
+              <a:tr h="370840">
+                <a:tc>
+                  <a:txBody>
+                    <a:bodyPr/>
+                    <a:lstStyle/>
+                    <a:p>
+                      <a:r>
+                        <a:rPr kumimoji="1" lang="en-US" altLang="ja-JP" dirty="0"/>
+                        <a:t>No</a:t>
+                      </a:r>
+                      <a:endParaRPr kumimoji="1" lang="ja-JP" altLang="en-US" dirty="0"/>
+                    </a:p>
+                  </a:txBody>
+                  <a:tcPr/>
+                </a:tc>
+                <a:tc>
+                  <a:txBody>
+                    <a:bodyPr/>
+                    <a:lstStyle/>
+                    <a:p>
+                      <a:r>
+                        <a:rPr kumimoji="1" lang="ja-JP" altLang="en-US" dirty="0"/>
+                        <a:t>課題</a:t>
+                      </a:r>
+                    </a:p>
+                  </a:txBody>
+                  <a:tcPr/>
+                </a:tc>
+                <a:tc>
+                  <a:txBody>
+                    <a:bodyPr/>
+                    <a:lstStyle/>
+                    <a:p>
+                      <a:r>
+                        <a:rPr kumimoji="1" lang="ja-JP" altLang="en-US" dirty="0"/>
+                        <a:t>補足</a:t>
+                      </a:r>
+                    </a:p>
+                  </a:txBody>
+                  <a:tcPr/>
+                </a:tc>
+                <a:extLst>
+                  <a:ext uri="{0D108BD9-81ED-4DB2-BD59-A6C34878D82A}">
+                    <a16:rowId xmlns:a16="http://schemas.microsoft.com/office/drawing/2014/main" val="590910442"/>
+                  </a:ext>
+                </a:extLst>
+              </a:tr>
+              <a:tr h="370840">
+                <a:tc>
+                  <a:txBody>
+                    <a:bodyPr/>
+                    <a:lstStyle/>
+                    <a:p>
+                      <a:r>
+                        <a:rPr kumimoji="1" lang="en-US" altLang="ja-JP" dirty="0"/>
+                        <a:t>1</a:t>
+                      </a:r>
+                      <a:endParaRPr kumimoji="1" lang="ja-JP" altLang="en-US" dirty="0"/>
+                    </a:p>
+                  </a:txBody>
+                  <a:tcPr/>
+                </a:tc>
+                <a:tc>
+                  <a:txBody>
+                    <a:bodyPr/>
+                    <a:lstStyle/>
+                    <a:p>
+                      <a:r>
+                        <a:rPr kumimoji="1" lang="ja-JP" altLang="en-US" dirty="0"/>
+                        <a:t>保存倉庫毎の品質ばらつき</a:t>
+                      </a:r>
+                    </a:p>
+                  </a:txBody>
+                  <a:tcPr/>
+                </a:tc>
+                <a:tc>
+                  <a:txBody>
+                    <a:bodyPr/>
+                    <a:lstStyle/>
+                    <a:p>
+                      <a:r>
+                        <a:rPr kumimoji="1" lang="ja-JP" altLang="en-US" dirty="0"/>
+                        <a:t>町田は温度管理不明</a:t>
+                      </a:r>
+                    </a:p>
+                  </a:txBody>
+                  <a:tcPr/>
+                </a:tc>
+                <a:extLst>
+                  <a:ext uri="{0D108BD9-81ED-4DB2-BD59-A6C34878D82A}">
+                    <a16:rowId xmlns:a16="http://schemas.microsoft.com/office/drawing/2014/main" val="3628945661"/>
+                  </a:ext>
+                </a:extLst>
+              </a:tr>
+              <a:tr h="370840">
+                <a:tc>
+                  <a:txBody>
+                    <a:bodyPr/>
+                    <a:lstStyle/>
+                    <a:p>
+                      <a:r>
+                        <a:rPr kumimoji="1" lang="en-US" altLang="ja-JP" dirty="0"/>
+                        <a:t>2</a:t>
+                      </a:r>
+                      <a:endParaRPr kumimoji="1" lang="ja-JP" altLang="en-US" dirty="0"/>
+                    </a:p>
+                  </a:txBody>
+                  <a:tcPr/>
+                </a:tc>
+                <a:tc>
+                  <a:txBody>
+                    <a:bodyPr/>
+                    <a:lstStyle/>
+                    <a:p>
+                      <a:r>
+                        <a:rPr kumimoji="1" lang="ja-JP" altLang="en-US" dirty="0"/>
+                        <a:t>輸入時のコンテナ毎の品質ばらつき</a:t>
+                      </a:r>
+                    </a:p>
+                  </a:txBody>
+                  <a:tcPr/>
+                </a:tc>
+                <a:tc>
+                  <a:txBody>
+                    <a:bodyPr/>
+                    <a:lstStyle/>
+                    <a:p>
+                      <a:r>
+                        <a:rPr kumimoji="1" lang="en-US" altLang="ja-JP" dirty="0"/>
+                        <a:t>b3</a:t>
+                      </a:r>
+                      <a:r>
+                        <a:rPr kumimoji="1" lang="ja-JP" altLang="en-US" dirty="0"/>
+                        <a:t>と</a:t>
+                      </a:r>
+                      <a:r>
+                        <a:rPr kumimoji="1" lang="en-US" altLang="ja-JP" dirty="0"/>
+                        <a:t>e2</a:t>
+                      </a:r>
+                      <a:endParaRPr kumimoji="1" lang="ja-JP" altLang="en-US" dirty="0"/>
+                    </a:p>
+                  </a:txBody>
+                  <a:tcPr/>
+                </a:tc>
+                <a:extLst>
+                  <a:ext uri="{0D108BD9-81ED-4DB2-BD59-A6C34878D82A}">
+                    <a16:rowId xmlns:a16="http://schemas.microsoft.com/office/drawing/2014/main" val="1341397582"/>
+                  </a:ext>
+                </a:extLst>
+              </a:tr>
+              <a:tr h="370840">
+                <a:tc>
+                  <a:txBody>
+                    <a:bodyPr/>
+                    <a:lstStyle/>
+                    <a:p>
+                      <a:r>
+                        <a:rPr kumimoji="1" lang="en-US" altLang="ja-JP" sz="2000" b="1" i="1" dirty="0">
+                          <a:solidFill>
+                            <a:srgbClr val="FF0000"/>
+                          </a:solidFill>
+                        </a:rPr>
+                        <a:t>3</a:t>
+                      </a:r>
+                      <a:endParaRPr kumimoji="1" lang="ja-JP" altLang="en-US" sz="2000" b="1" i="1" dirty="0">
+                        <a:solidFill>
+                          <a:srgbClr val="FF0000"/>
+                        </a:solidFill>
+                      </a:endParaRPr>
+                    </a:p>
+                  </a:txBody>
+                  <a:tcPr/>
+                </a:tc>
+                <a:tc>
+                  <a:txBody>
+                    <a:bodyPr/>
+                    <a:lstStyle/>
+                    <a:p>
+                      <a:r>
+                        <a:rPr kumimoji="1" lang="ja-JP" altLang="en-US" sz="2000" b="1" i="1" strike="noStrike" dirty="0"/>
+                        <a:t>盗難対策</a:t>
+                      </a:r>
+                    </a:p>
+                  </a:txBody>
+                  <a:tcPr>
+                    <a:solidFill>
+                      <a:srgbClr val="FF0000"/>
+                    </a:solidFill>
+                  </a:tcPr>
+                </a:tc>
+                <a:tc>
+                  <a:txBody>
+                    <a:bodyPr/>
+                    <a:lstStyle/>
+                    <a:p>
+                      <a:r>
+                        <a:rPr kumimoji="1" lang="en-US" altLang="ja-JP" sz="2000" b="1" i="1" dirty="0">
+                          <a:highlight>
+                            <a:srgbClr val="FFFF00"/>
+                          </a:highlight>
+                        </a:rPr>
+                        <a:t>b3</a:t>
+                      </a:r>
+                      <a:r>
+                        <a:rPr kumimoji="1" lang="ja-JP" altLang="en-US" sz="2000" b="1" i="1" dirty="0">
+                          <a:highlight>
+                            <a:srgbClr val="FFFF00"/>
+                          </a:highlight>
+                        </a:rPr>
+                        <a:t>で顕著</a:t>
+                      </a:r>
+                    </a:p>
+                  </a:txBody>
+                  <a:tcPr/>
+                </a:tc>
+                <a:extLst>
+                  <a:ext uri="{0D108BD9-81ED-4DB2-BD59-A6C34878D82A}">
+                    <a16:rowId xmlns:a16="http://schemas.microsoft.com/office/drawing/2014/main" val="3306636690"/>
+                  </a:ext>
+                </a:extLst>
+              </a:tr>
+            </a:tbl>
+          </a:graphicData>
+        </a:graphic>
+      </p:graphicFrame>
+      <p:sp>
+        <p:nvSpPr>
+          <p:cNvPr id="3" name="テキスト ボックス 2">
+            <a:extLst>
+              <a:ext uri="{FF2B5EF4-FFF2-40B4-BE49-F238E27FC236}">
+                <a16:creationId xmlns:a16="http://schemas.microsoft.com/office/drawing/2014/main" id="{21530B41-99DA-BF5E-B4BD-C077E86A6813}"/>
+              </a:ext>
+            </a:extLst>
+          </p:cNvPr>
+          <p:cNvSpPr txBox="1"/>
+          <p:nvPr/>
+        </p:nvSpPr>
+        <p:spPr>
+          <a:xfrm>
+            <a:off x="866274" y="1440217"/>
+            <a:ext cx="851515" cy="369332"/>
+          </a:xfrm>
+          <a:prstGeom prst="rect">
+            <a:avLst/>
+          </a:prstGeom>
+          <a:noFill/>
+        </p:spPr>
+        <p:txBody>
+          <a:bodyPr wrap="none" rtlCol="0">
+            <a:spAutoFit/>
+          </a:bodyPr>
+          <a:lstStyle/>
+          <a:p>
+            <a:r>
+              <a:rPr kumimoji="1" lang="ja-JP" altLang="en-US" dirty="0"/>
+              <a:t>バナナ</a:t>
+            </a:r>
+          </a:p>
+        </p:txBody>
+      </p:sp>
+    </p:spTree>
+    <p:extLst>
+      <p:ext uri="{BB962C8B-B14F-4D97-AF65-F5344CB8AC3E}">
+        <p14:creationId xmlns:p14="http://schemas.microsoft.com/office/powerpoint/2010/main" val="1907145432"/>
+      </p:ext>
+    </p:extLst>
+  </p:cSld>
+  <p:clrMapOvr>
+    <a:masterClrMapping/>
+  </p:clrMapOvr>
+</p:sld>
+</file>
+
+<file path=ppt/slides/slide11.xml><?xml version="1.0" encoding="utf-8"?>
+<p:sld xmlns:a="http://schemas.openxmlformats.org/drawingml/2006/main" xmlns:r="http://schemas.openxmlformats.org/officeDocument/2006/relationships" xmlns:p="http://schemas.openxmlformats.org/presentationml/2006/main">
+  <p:cSld>
+    <p:spTree>
+      <p:nvGrpSpPr>
+        <p:cNvPr id="1" name=""/>
+        <p:cNvGrpSpPr/>
+        <p:nvPr/>
+      </p:nvGrpSpPr>
+      <p:grpSpPr>
+        <a:xfrm>
+          <a:off x="0" y="0"/>
+          <a:ext cx="0" cy="0"/>
+          <a:chOff x="0" y="0"/>
+          <a:chExt cx="0" cy="0"/>
+        </a:xfrm>
+      </p:grpSpPr>
+      <p:sp>
+        <p:nvSpPr>
+          <p:cNvPr id="3" name="コンテンツ プレースホルダー 2">
+            <a:extLst>
+              <a:ext uri="{FF2B5EF4-FFF2-40B4-BE49-F238E27FC236}">
+                <a16:creationId xmlns:a16="http://schemas.microsoft.com/office/drawing/2014/main" id="{F6DA134E-EE89-7489-E626-6D24722DD96A}"/>
+              </a:ext>
+            </a:extLst>
+          </p:cNvPr>
+          <p:cNvSpPr>
+            <a:spLocks noGrp="1"/>
+          </p:cNvSpPr>
+          <p:nvPr>
+            <p:ph idx="1"/>
+          </p:nvPr>
+        </p:nvSpPr>
+        <p:spPr/>
+        <p:txBody>
+          <a:bodyPr/>
+          <a:lstStyle/>
+          <a:p>
+            <a:r>
+              <a:rPr kumimoji="1" lang="ja-JP" altLang="en-US" dirty="0"/>
+              <a:t>タイトルのないページ</a:t>
+            </a:r>
+          </a:p>
+        </p:txBody>
+      </p:sp>
+    </p:spTree>
+    <p:extLst>
+      <p:ext uri="{BB962C8B-B14F-4D97-AF65-F5344CB8AC3E}">
+        <p14:creationId xmlns:p14="http://schemas.microsoft.com/office/powerpoint/2010/main" val="795806914"/>
+      </p:ext>
+    </p:extLst>
+  </p:cSld>
+  <p:clrMapOvr>
+    <a:masterClrMapping/>
+  </p:clrMapOvr>
+</p:sld>
+</file>
+
+<file path=ppt/slides/slide12.xml><?xml version="1.0" encoding="utf-8"?>
+<p:sld xmlns:a="http://schemas.openxmlformats.org/drawingml/2006/main" xmlns:r="http://schemas.openxmlformats.org/officeDocument/2006/relationships" xmlns:p="http://schemas.openxmlformats.org/presentationml/2006/main">
+  <p:cSld>
+    <p:spTree>
+      <p:nvGrpSpPr>
+        <p:cNvPr id="1" name="">
+          <a:extLst>
+            <a:ext uri="{FF2B5EF4-FFF2-40B4-BE49-F238E27FC236}">
+              <a16:creationId xmlns:a16="http://schemas.microsoft.com/office/drawing/2014/main" id="{46F06142-CFD4-956E-89F1-163615DC0DE7}"/>
+            </a:ext>
+          </a:extLst>
+        </p:cNvPr>
+        <p:cNvGrpSpPr/>
+        <p:nvPr/>
+      </p:nvGrpSpPr>
+      <p:grpSpPr>
+        <a:xfrm>
+          <a:off x="0" y="0"/>
+          <a:ext cx="0" cy="0"/>
+          <a:chOff x="0" y="0"/>
+          <a:chExt cx="0" cy="0"/>
+        </a:xfrm>
+      </p:grpSpPr>
+      <p:sp>
+        <p:nvSpPr>
+          <p:cNvPr id="2" name="タイトル 1">
+            <a:extLst>
+              <a:ext uri="{FF2B5EF4-FFF2-40B4-BE49-F238E27FC236}">
+                <a16:creationId xmlns:a16="http://schemas.microsoft.com/office/drawing/2014/main" id="{D8254C5C-DEA5-44C7-15F1-56FC63946CD7}"/>
+              </a:ext>
+            </a:extLst>
+          </p:cNvPr>
+          <p:cNvSpPr>
+            <a:spLocks noGrp="1"/>
+          </p:cNvSpPr>
+          <p:nvPr>
+            <p:ph type="title"/>
+          </p:nvPr>
+        </p:nvSpPr>
+        <p:spPr/>
+        <p:txBody>
+          <a:bodyPr/>
+          <a:lstStyle/>
+          <a:p>
+            <a:r>
+              <a:rPr kumimoji="1" lang="en-US" altLang="ja-JP" dirty="0"/>
+              <a:t>table test slide</a:t>
+            </a:r>
+            <a:r>
+              <a:rPr kumimoji="1" lang="ja-JP" altLang="en-US" dirty="0"/>
+              <a:t> りんご</a:t>
+            </a:r>
+          </a:p>
+        </p:txBody>
+      </p:sp>
+      <p:graphicFrame>
+        <p:nvGraphicFramePr>
+          <p:cNvPr id="4" name="コンテンツ プレースホルダー 3">
+            <a:extLst>
+              <a:ext uri="{FF2B5EF4-FFF2-40B4-BE49-F238E27FC236}">
+                <a16:creationId xmlns:a16="http://schemas.microsoft.com/office/drawing/2014/main" id="{18CD5D6E-FBB9-4FB1-9E72-95193951F56C}"/>
+              </a:ext>
+            </a:extLst>
+          </p:cNvPr>
+          <p:cNvGraphicFramePr>
+            <a:graphicFrameLocks noGrp="1"/>
+          </p:cNvGraphicFramePr>
+          <p:nvPr>
+            <p:ph idx="1"/>
+            <p:extLst>
+              <p:ext uri="{D42A27DB-BD31-4B8C-83A1-F6EECF244321}">
+                <p14:modId xmlns:p14="http://schemas.microsoft.com/office/powerpoint/2010/main" val="1277998238"/>
+              </p:ext>
+            </p:extLst>
+          </p:nvPr>
+        </p:nvGraphicFramePr>
+        <p:xfrm>
+          <a:off x="1455019" y="4521334"/>
+          <a:ext cx="4937760" cy="2047240"/>
         </p:xfrm>
         <a:graphic>
           <a:graphicData uri="http://schemas.openxmlformats.org/drawingml/2006/table">
@@ -3275,10 +3729,17 @@
                     </a:ext>
                   </a:extLst>
                 </a:gridCol>
-                <a:gridCol w="1645920">
+                <a:gridCol w="845419">
                   <a:extLst>
                     <a:ext uri="{9D8B030D-6E8A-4147-A177-3AD203B41FA5}">
                       <a16:colId xmlns:a16="http://schemas.microsoft.com/office/drawing/2014/main" val="1931103551"/>
+                    </a:ext>
+                  </a:extLst>
+                </a:gridCol>
+                <a:gridCol w="800501">
+                  <a:extLst>
+                    <a:ext uri="{9D8B030D-6E8A-4147-A177-3AD203B41FA5}">
+                      <a16:colId xmlns:a16="http://schemas.microsoft.com/office/drawing/2014/main" val="2593271952"/>
                     </a:ext>
                   </a:extLst>
                 </a:gridCol>
@@ -3305,7 +3766,7 @@
                   </a:txBody>
                   <a:tcPr/>
                 </a:tc>
-                <a:tc>
+                <a:tc gridSpan="2">
                   <a:txBody>
                     <a:bodyPr/>
                     <a:lstStyle/>
@@ -3315,6 +3776,16 @@
                         <a:t>head2</a:t>
                       </a:r>
                       <a:endParaRPr kumimoji="1" lang="ja-JP" altLang="en-US" dirty="0"/>
+                    </a:p>
+                  </a:txBody>
+                  <a:tcPr/>
+                </a:tc>
+                <a:tc hMerge="1">
+                  <a:txBody>
+                    <a:bodyPr/>
+                    <a:lstStyle/>
+                    <a:p>
+                      <a:endParaRPr kumimoji="1" lang="ja-JP" altLang="en-US"/>
                     </a:p>
                   </a:txBody>
                   <a:tcPr/>
@@ -3340,7 +3811,7 @@
                 </a:extLst>
               </a:tr>
               <a:tr h="370840">
-                <a:tc>
+                <a:tc gridSpan="3">
                   <a:txBody>
                     <a:bodyPr/>
                     <a:lstStyle/>
@@ -3349,21 +3820,34 @@
                         <a:rPr kumimoji="1" lang="en-US" altLang="ja-JP" dirty="0"/>
                         <a:t>a1</a:t>
                       </a:r>
-                      <a:endParaRPr kumimoji="1" lang="ja-JP" altLang="en-US" dirty="0"/>
-                    </a:p>
-                  </a:txBody>
-                  <a:tcPr/>
-                </a:tc>
-                <a:tc>
-                  <a:txBody>
-                    <a:bodyPr/>
-                    <a:lstStyle/>
-                    <a:p>
+                      <a:br>
+                        <a:rPr kumimoji="1" lang="en-US" altLang="ja-JP" dirty="0"/>
+                      </a:br>
                       <a:r>
                         <a:rPr kumimoji="1" lang="en-US" altLang="ja-JP" dirty="0"/>
                         <a:t>a2</a:t>
                       </a:r>
                       <a:endParaRPr kumimoji="1" lang="ja-JP" altLang="en-US" dirty="0"/>
+                    </a:p>
+                  </a:txBody>
+                  <a:tcPr/>
+                </a:tc>
+                <a:tc hMerge="1">
+                  <a:txBody>
+                    <a:bodyPr/>
+                    <a:lstStyle/>
+                    <a:p>
+                      <a:endParaRPr kumimoji="1" lang="ja-JP" altLang="en-US" dirty="0"/>
+                    </a:p>
+                  </a:txBody>
+                  <a:tcPr/>
+                </a:tc>
+                <a:tc hMerge="1">
+                  <a:txBody>
+                    <a:bodyPr/>
+                    <a:lstStyle/>
+                    <a:p>
+                      <a:endParaRPr kumimoji="1" lang="ja-JP" altLang="en-US"/>
                     </a:p>
                   </a:txBody>
                   <a:tcPr/>
@@ -3389,7 +3873,7 @@
                 </a:extLst>
               </a:tr>
               <a:tr h="370840">
-                <a:tc>
+                <a:tc gridSpan="3">
                   <a:txBody>
                     <a:bodyPr/>
                     <a:lstStyle/>
@@ -3400,13 +3884,6 @@
                       </a:r>
                       <a:endParaRPr kumimoji="1" lang="ja-JP" altLang="en-US" dirty="0"/>
                     </a:p>
-                  </a:txBody>
-                  <a:tcPr/>
-                </a:tc>
-                <a:tc>
-                  <a:txBody>
-                    <a:bodyPr/>
-                    <a:lstStyle/>
                     <a:p>
                       <a:r>
                         <a:rPr kumimoji="1" lang="en-US" altLang="ja-JP" dirty="0"/>
@@ -3417,7 +3894,37 @@
                   </a:txBody>
                   <a:tcPr/>
                 </a:tc>
-                <a:tc>
+                <a:tc hMerge="1">
+                  <a:txBody>
+                    <a:bodyPr/>
+                    <a:lstStyle/>
+                    <a:p>
+                      <a:endParaRPr kumimoji="1" lang="ja-JP" altLang="en-US" dirty="0"/>
+                    </a:p>
+                  </a:txBody>
+                  <a:tcPr/>
+                </a:tc>
+                <a:tc hMerge="1">
+                  <a:txBody>
+                    <a:bodyPr/>
+                    <a:lstStyle/>
+                    <a:p>
+                      <a:endParaRPr kumimoji="1" lang="ja-JP" altLang="en-US" dirty="0"/>
+                    </a:p>
+                  </a:txBody>
+                  <a:tcPr>
+                    <a:lnL w="12700" cap="flat" cmpd="sng" algn="ctr">
+                      <a:solidFill>
+                        <a:schemeClr val="tx1"/>
+                      </a:solidFill>
+                      <a:prstDash val="solid"/>
+                      <a:round/>
+                      <a:headEnd type="none" w="med" len="med"/>
+                      <a:tailEnd type="none" w="med" len="med"/>
+                    </a:lnL>
+                  </a:tcPr>
+                </a:tc>
+                <a:tc rowSpan="2">
                   <a:txBody>
                     <a:bodyPr/>
                     <a:lstStyle/>
@@ -3427,6 +3934,21 @@
                         <a:t>b3</a:t>
                       </a:r>
                       <a:endParaRPr kumimoji="1" lang="ja-JP" altLang="en-US" dirty="0"/>
+                    </a:p>
+                    <a:p>
+                      <a:r>
+                        <a:rPr kumimoji="1" lang="en-US" altLang="ja-JP" sz="2000" b="1" i="1" dirty="0">
+                          <a:highlight>
+                            <a:srgbClr val="FFFF00"/>
+                          </a:highlight>
+                        </a:rPr>
+                        <a:t>C3</a:t>
+                      </a:r>
+                      <a:endParaRPr kumimoji="1" lang="ja-JP" altLang="en-US" sz="2000" b="1" i="1" dirty="0">
+                        <a:highlight>
+                          <a:srgbClr val="FFFF00"/>
+                        </a:highlight>
+                      </a:endParaRPr>
                     </a:p>
                   </a:txBody>
                   <a:tcPr/>
@@ -3473,6 +3995,15 @@
                     </a:p>
                   </a:txBody>
                   <a:tcPr>
+                    <a:lnR w="12700" cap="flat" cmpd="sng" algn="ctr">
+                      <a:solidFill>
+                        <a:schemeClr val="tx1"/>
+                      </a:solidFill>
+                      <a:prstDash val="solid"/>
+                      <a:round/>
+                      <a:headEnd type="none" w="med" len="med"/>
+                      <a:tailEnd type="none" w="med" len="med"/>
+                    </a:lnR>
                     <a:solidFill>
                       <a:srgbClr val="FF0000"/>
                     </a:solidFill>
@@ -3484,13 +4015,32 @@
                     <a:lstStyle/>
                     <a:p>
                       <a:r>
-                        <a:rPr kumimoji="1" lang="en-US" altLang="ja-JP" sz="2000" b="1" i="1" dirty="0">
-                          <a:highlight>
-                            <a:srgbClr val="FFFF00"/>
-                          </a:highlight>
-                        </a:rPr>
-                        <a:t>C3</a:t>
-                      </a:r>
+                        <a:rPr kumimoji="1" lang="en-US" altLang="ja-JP" sz="2000" b="1" i="1" strike="sngStrike" dirty="0"/>
+                        <a:t>C2-2</a:t>
+                      </a:r>
+                      <a:endParaRPr kumimoji="1" lang="ja-JP" altLang="en-US" sz="2000" b="1" i="1" strike="sngStrike" dirty="0"/>
+                    </a:p>
+                  </a:txBody>
+                  <a:tcPr>
+                    <a:lnL w="12700" cap="flat" cmpd="sng" algn="ctr">
+                      <a:solidFill>
+                        <a:schemeClr val="tx1"/>
+                      </a:solidFill>
+                      <a:prstDash val="solid"/>
+                      <a:round/>
+                      <a:headEnd type="none" w="med" len="med"/>
+                      <a:tailEnd type="none" w="med" len="med"/>
+                    </a:lnL>
+                    <a:solidFill>
+                      <a:srgbClr val="FF0000"/>
+                    </a:solidFill>
+                  </a:tcPr>
+                </a:tc>
+                <a:tc vMerge="1">
+                  <a:txBody>
+                    <a:bodyPr/>
+                    <a:lstStyle/>
+                    <a:p>
                       <a:endParaRPr kumimoji="1" lang="ja-JP" altLang="en-US" sz="2000" b="1" i="1" dirty="0">
                         <a:highlight>
                           <a:srgbClr val="FFFF00"/>
@@ -3510,10 +4060,1254 @@
           </a:graphicData>
         </a:graphic>
       </p:graphicFrame>
+      <p:sp>
+        <p:nvSpPr>
+          <p:cNvPr id="3" name="テキスト ボックス 2">
+            <a:extLst>
+              <a:ext uri="{FF2B5EF4-FFF2-40B4-BE49-F238E27FC236}">
+                <a16:creationId xmlns:a16="http://schemas.microsoft.com/office/drawing/2014/main" id="{C08EF5E2-B6B0-10ED-9BDB-8AB111AE10D0}"/>
+              </a:ext>
+            </a:extLst>
+          </p:cNvPr>
+          <p:cNvSpPr txBox="1"/>
+          <p:nvPr/>
+        </p:nvSpPr>
+        <p:spPr>
+          <a:xfrm>
+            <a:off x="991402" y="2791326"/>
+            <a:ext cx="1408975" cy="369332"/>
+          </a:xfrm>
+          <a:prstGeom prst="rect">
+            <a:avLst/>
+          </a:prstGeom>
+          <a:noFill/>
+        </p:spPr>
+        <p:txBody>
+          <a:bodyPr wrap="none" rtlCol="0">
+            <a:spAutoFit/>
+          </a:bodyPr>
+          <a:lstStyle/>
+          <a:p>
+            <a:r>
+              <a:rPr kumimoji="1" lang="en-US" altLang="ja-JP" dirty="0"/>
+              <a:t>Table Name2</a:t>
+            </a:r>
+            <a:endParaRPr kumimoji="1" lang="ja-JP" altLang="en-US" dirty="0"/>
+          </a:p>
+        </p:txBody>
+      </p:sp>
+      <p:graphicFrame>
+        <p:nvGraphicFramePr>
+          <p:cNvPr id="5" name="表 4">
+            <a:extLst>
+              <a:ext uri="{FF2B5EF4-FFF2-40B4-BE49-F238E27FC236}">
+                <a16:creationId xmlns:a16="http://schemas.microsoft.com/office/drawing/2014/main" id="{925AFBB8-CA18-EC81-426D-540BD02A5AEB}"/>
+              </a:ext>
+            </a:extLst>
+          </p:cNvPr>
+          <p:cNvGraphicFramePr>
+            <a:graphicFrameLocks noGrp="1"/>
+          </p:cNvGraphicFramePr>
+          <p:nvPr>
+            <p:extLst>
+              <p:ext uri="{D42A27DB-BD31-4B8C-83A1-F6EECF244321}">
+                <p14:modId xmlns:p14="http://schemas.microsoft.com/office/powerpoint/2010/main" val="568816485"/>
+              </p:ext>
+            </p:extLst>
+          </p:nvPr>
+        </p:nvGraphicFramePr>
+        <p:xfrm>
+          <a:off x="1119739" y="1313046"/>
+          <a:ext cx="7562249" cy="2844800"/>
+        </p:xfrm>
+        <a:graphic>
+          <a:graphicData uri="http://schemas.openxmlformats.org/drawingml/2006/table">
+            <a:tbl>
+              <a:tblPr firstRow="1" bandRow="1">
+                <a:tableStyleId>{5C22544A-7EE6-4342-B048-85BDC9FD1C3A}</a:tableStyleId>
+              </a:tblPr>
+              <a:tblGrid>
+                <a:gridCol w="2259000">
+                  <a:extLst>
+                    <a:ext uri="{9D8B030D-6E8A-4147-A177-3AD203B41FA5}">
+                      <a16:colId xmlns:a16="http://schemas.microsoft.com/office/drawing/2014/main" val="46205011"/>
+                    </a:ext>
+                  </a:extLst>
+                </a:gridCol>
+                <a:gridCol w="2259000">
+                  <a:extLst>
+                    <a:ext uri="{9D8B030D-6E8A-4147-A177-3AD203B41FA5}">
+                      <a16:colId xmlns:a16="http://schemas.microsoft.com/office/drawing/2014/main" val="2222435913"/>
+                    </a:ext>
+                  </a:extLst>
+                </a:gridCol>
+                <a:gridCol w="3044249">
+                  <a:extLst>
+                    <a:ext uri="{9D8B030D-6E8A-4147-A177-3AD203B41FA5}">
+                      <a16:colId xmlns:a16="http://schemas.microsoft.com/office/drawing/2014/main" val="1428640392"/>
+                    </a:ext>
+                  </a:extLst>
+                </a:gridCol>
+              </a:tblGrid>
+              <a:tr h="343301">
+                <a:tc>
+                  <a:txBody>
+                    <a:bodyPr/>
+                    <a:lstStyle/>
+                    <a:p>
+                      <a:r>
+                        <a:rPr kumimoji="1" lang="en-US" altLang="ja-JP" dirty="0"/>
+                        <a:t>No</a:t>
+                      </a:r>
+                      <a:endParaRPr kumimoji="1" lang="ja-JP" altLang="en-US" dirty="0"/>
+                    </a:p>
+                  </a:txBody>
+                  <a:tcPr/>
+                </a:tc>
+                <a:tc>
+                  <a:txBody>
+                    <a:bodyPr/>
+                    <a:lstStyle/>
+                    <a:p>
+                      <a:r>
+                        <a:rPr kumimoji="1" lang="ja-JP" altLang="en-US" dirty="0"/>
+                        <a:t>課題</a:t>
+                      </a:r>
+                    </a:p>
+                  </a:txBody>
+                  <a:tcPr/>
+                </a:tc>
+                <a:tc>
+                  <a:txBody>
+                    <a:bodyPr/>
+                    <a:lstStyle/>
+                    <a:p>
+                      <a:r>
+                        <a:rPr kumimoji="1" lang="ja-JP" altLang="en-US" dirty="0"/>
+                        <a:t>補足</a:t>
+                      </a:r>
+                    </a:p>
+                  </a:txBody>
+                  <a:tcPr/>
+                </a:tc>
+                <a:extLst>
+                  <a:ext uri="{0D108BD9-81ED-4DB2-BD59-A6C34878D82A}">
+                    <a16:rowId xmlns:a16="http://schemas.microsoft.com/office/drawing/2014/main" val="3389817405"/>
+                  </a:ext>
+                </a:extLst>
+              </a:tr>
+              <a:tr h="370840">
+                <a:tc>
+                  <a:txBody>
+                    <a:bodyPr/>
+                    <a:lstStyle/>
+                    <a:p>
+                      <a:r>
+                        <a:rPr kumimoji="1" lang="en-US" altLang="ja-JP" dirty="0"/>
+                        <a:t>1</a:t>
+                      </a:r>
+                      <a:endParaRPr kumimoji="1" lang="ja-JP" altLang="en-US" dirty="0"/>
+                    </a:p>
+                  </a:txBody>
+                  <a:tcPr/>
+                </a:tc>
+                <a:tc>
+                  <a:txBody>
+                    <a:bodyPr/>
+                    <a:lstStyle/>
+                    <a:p>
+                      <a:r>
+                        <a:rPr kumimoji="1" lang="ja-JP" altLang="en-US" dirty="0"/>
+                        <a:t>在庫欠損</a:t>
+                      </a:r>
+                    </a:p>
+                  </a:txBody>
+                  <a:tcPr/>
+                </a:tc>
+                <a:tc>
+                  <a:txBody>
+                    <a:bodyPr/>
+                    <a:lstStyle/>
+                    <a:p>
+                      <a:r>
+                        <a:rPr kumimoji="1" lang="ja-JP" altLang="en-US" dirty="0"/>
+                        <a:t>これ</a:t>
+                      </a:r>
+                    </a:p>
+                  </a:txBody>
+                  <a:tcPr/>
+                </a:tc>
+                <a:extLst>
+                  <a:ext uri="{0D108BD9-81ED-4DB2-BD59-A6C34878D82A}">
+                    <a16:rowId xmlns:a16="http://schemas.microsoft.com/office/drawing/2014/main" val="1705669622"/>
+                  </a:ext>
+                </a:extLst>
+              </a:tr>
+              <a:tr h="370840">
+                <a:tc>
+                  <a:txBody>
+                    <a:bodyPr/>
+                    <a:lstStyle/>
+                    <a:p>
+                      <a:r>
+                        <a:rPr kumimoji="1" lang="en-US" altLang="ja-JP" dirty="0"/>
+                        <a:t>2</a:t>
+                      </a:r>
+                      <a:endParaRPr kumimoji="1" lang="ja-JP" altLang="en-US" dirty="0"/>
+                    </a:p>
+                  </a:txBody>
+                  <a:tcPr/>
+                </a:tc>
+                <a:tc>
+                  <a:txBody>
+                    <a:bodyPr/>
+                    <a:lstStyle/>
+                    <a:p>
+                      <a:r>
+                        <a:rPr kumimoji="1" lang="ja-JP" altLang="en-US" dirty="0"/>
+                        <a:t>暖房費用</a:t>
+                      </a:r>
+                    </a:p>
+                  </a:txBody>
+                  <a:tcPr/>
+                </a:tc>
+                <a:tc>
+                  <a:txBody>
+                    <a:bodyPr/>
+                    <a:lstStyle/>
+                    <a:p>
+                      <a:r>
+                        <a:rPr kumimoji="1" lang="ja-JP" altLang="en-US" dirty="0"/>
+                        <a:t>どれ</a:t>
+                      </a:r>
+                    </a:p>
+                  </a:txBody>
+                  <a:tcPr/>
+                </a:tc>
+                <a:extLst>
+                  <a:ext uri="{0D108BD9-81ED-4DB2-BD59-A6C34878D82A}">
+                    <a16:rowId xmlns:a16="http://schemas.microsoft.com/office/drawing/2014/main" val="2464415206"/>
+                  </a:ext>
+                </a:extLst>
+              </a:tr>
+              <a:tr h="370840">
+                <a:tc>
+                  <a:txBody>
+                    <a:bodyPr/>
+                    <a:lstStyle/>
+                    <a:p>
+                      <a:r>
+                        <a:rPr kumimoji="1" lang="en-US" altLang="ja-JP" dirty="0"/>
+                        <a:t>3</a:t>
+                      </a:r>
+                      <a:endParaRPr kumimoji="1" lang="ja-JP" altLang="en-US" dirty="0"/>
+                    </a:p>
+                  </a:txBody>
+                  <a:tcPr/>
+                </a:tc>
+                <a:tc>
+                  <a:txBody>
+                    <a:bodyPr/>
+                    <a:lstStyle/>
+                    <a:p>
+                      <a:r>
+                        <a:rPr kumimoji="1" lang="ja-JP" altLang="en-US" dirty="0"/>
+                        <a:t>問題が管理されていない</a:t>
+                      </a:r>
+                      <a:endParaRPr kumimoji="1" lang="en-US" altLang="ja-JP" dirty="0"/>
+                    </a:p>
+                    <a:p>
+                      <a:r>
+                        <a:rPr kumimoji="1" lang="en-US" altLang="ja-JP" dirty="0"/>
+                        <a:t>[</a:t>
+                      </a:r>
+                      <a:r>
+                        <a:rPr kumimoji="1" lang="ja-JP" altLang="en-US" dirty="0"/>
+                        <a:t>問題管理</a:t>
+                      </a:r>
+                      <a:r>
+                        <a:rPr kumimoji="1" lang="en-US" altLang="ja-JP" dirty="0"/>
+                        <a:t>]</a:t>
+                      </a:r>
+                      <a:br>
+                        <a:rPr kumimoji="1" lang="en-US" altLang="ja-JP" dirty="0"/>
+                      </a:br>
+                      <a:r>
+                        <a:rPr kumimoji="1" lang="ja-JP" altLang="en-US" dirty="0"/>
+                        <a:t>問題を管理する方法の確認</a:t>
+                      </a:r>
+                    </a:p>
+                  </a:txBody>
+                  <a:tcPr/>
+                </a:tc>
+                <a:tc>
+                  <a:txBody>
+                    <a:bodyPr/>
+                    <a:lstStyle/>
+                    <a:p>
+                      <a:r>
+                        <a:rPr kumimoji="1" lang="en-US" altLang="ja-JP" dirty="0"/>
+                        <a:t>[</a:t>
+                      </a:r>
+                      <a:r>
+                        <a:rPr kumimoji="1" lang="ja-JP" altLang="en-US" dirty="0"/>
+                        <a:t>先月</a:t>
+                      </a:r>
+                      <a:r>
+                        <a:rPr kumimoji="1" lang="en-US" altLang="ja-JP" dirty="0"/>
+                        <a:t>]</a:t>
+                      </a:r>
+                      <a:br>
+                        <a:rPr kumimoji="1" lang="en-US" altLang="ja-JP" dirty="0"/>
+                      </a:br>
+                      <a:r>
+                        <a:rPr kumimoji="1" lang="ja-JP" altLang="en-US" dirty="0"/>
+                        <a:t>まだでした</a:t>
+                      </a:r>
+                      <a:endParaRPr kumimoji="1" lang="en-US" altLang="ja-JP" dirty="0"/>
+                    </a:p>
+                    <a:p>
+                      <a:pPr marL="0" marR="0" lvl="0" indent="0" algn="l" defTabSz="457200" rtl="0" eaLnBrk="1" fontAlgn="auto" latinLnBrk="0" hangingPunct="1">
+                        <a:lnSpc>
+                          <a:spcPct val="100000"/>
+                        </a:lnSpc>
+                        <a:spcBef>
+                          <a:spcPts val="0"/>
+                        </a:spcBef>
+                        <a:spcAft>
+                          <a:spcPts val="0"/>
+                        </a:spcAft>
+                        <a:buClrTx/>
+                        <a:buSzTx/>
+                        <a:buFontTx/>
+                        <a:buNone/>
+                        <a:tabLst/>
+                        <a:defRPr/>
+                      </a:pPr>
+                      <a:r>
+                        <a:rPr kumimoji="1" lang="en-US" altLang="ja-JP" dirty="0"/>
+                        <a:t>[</a:t>
+                      </a:r>
+                      <a:r>
+                        <a:rPr kumimoji="1" lang="ja-JP" altLang="en-US" dirty="0"/>
+                        <a:t>今月</a:t>
+                      </a:r>
+                      <a:r>
+                        <a:rPr kumimoji="1" lang="en-US" altLang="ja-JP" dirty="0"/>
+                        <a:t>]</a:t>
+                      </a:r>
+                      <a:br>
+                        <a:rPr kumimoji="1" lang="en-US" altLang="ja-JP" dirty="0"/>
+                      </a:br>
+                      <a:r>
+                        <a:rPr kumimoji="1" lang="ja-JP" altLang="en-US" dirty="0"/>
+                        <a:t>まだでした</a:t>
+                      </a:r>
+                      <a:br>
+                        <a:rPr kumimoji="1" lang="en-US" altLang="ja-JP" dirty="0"/>
+                      </a:br>
+                      <a:r>
+                        <a:rPr kumimoji="1" lang="en-US" altLang="ja-JP" dirty="0"/>
+                        <a:t>[</a:t>
+                      </a:r>
+                      <a:r>
+                        <a:rPr kumimoji="1" lang="ja-JP" altLang="en-US" dirty="0"/>
+                        <a:t>残タスク</a:t>
+                      </a:r>
+                      <a:r>
+                        <a:rPr kumimoji="1" lang="en-US" altLang="ja-JP" dirty="0"/>
+                        <a:t>]</a:t>
+                      </a:r>
+                      <a:br>
+                        <a:rPr kumimoji="1" lang="en-US" altLang="ja-JP" dirty="0"/>
+                      </a:br>
+                      <a:r>
+                        <a:rPr kumimoji="1" lang="ja-JP" altLang="en-US" dirty="0"/>
+                        <a:t>内容把握を再度行いたい</a:t>
+                      </a:r>
+                    </a:p>
+                  </a:txBody>
+                  <a:tcPr/>
+                </a:tc>
+                <a:extLst>
+                  <a:ext uri="{0D108BD9-81ED-4DB2-BD59-A6C34878D82A}">
+                    <a16:rowId xmlns:a16="http://schemas.microsoft.com/office/drawing/2014/main" val="3380041663"/>
+                  </a:ext>
+                </a:extLst>
+              </a:tr>
+            </a:tbl>
+          </a:graphicData>
+        </a:graphic>
+      </p:graphicFrame>
     </p:spTree>
     <p:extLst>
       <p:ext uri="{BB962C8B-B14F-4D97-AF65-F5344CB8AC3E}">
-        <p14:creationId xmlns:p14="http://schemas.microsoft.com/office/powerpoint/2010/main" val="1907145432"/>
+        <p14:creationId xmlns:p14="http://schemas.microsoft.com/office/powerpoint/2010/main" val="273233105"/>
+      </p:ext>
+    </p:extLst>
+  </p:cSld>
+  <p:clrMapOvr>
+    <a:masterClrMapping/>
+  </p:clrMapOvr>
+</p:sld>
+</file>
+
+<file path=ppt/slides/slide13.xml><?xml version="1.0" encoding="utf-8"?>
+<p:sld xmlns:a="http://schemas.openxmlformats.org/drawingml/2006/main" xmlns:r="http://schemas.openxmlformats.org/officeDocument/2006/relationships" xmlns:p="http://schemas.openxmlformats.org/presentationml/2006/main">
+  <p:cSld>
+    <p:spTree>
+      <p:nvGrpSpPr>
+        <p:cNvPr id="1" name="">
+          <a:extLst>
+            <a:ext uri="{FF2B5EF4-FFF2-40B4-BE49-F238E27FC236}">
+              <a16:creationId xmlns:a16="http://schemas.microsoft.com/office/drawing/2014/main" id="{A8B092EB-CA66-DEF7-7EAE-DC5D8FFEF4E0}"/>
+            </a:ext>
+          </a:extLst>
+        </p:cNvPr>
+        <p:cNvGrpSpPr/>
+        <p:nvPr/>
+      </p:nvGrpSpPr>
+      <p:grpSpPr>
+        <a:xfrm>
+          <a:off x="0" y="0"/>
+          <a:ext cx="0" cy="0"/>
+          <a:chOff x="0" y="0"/>
+          <a:chExt cx="0" cy="0"/>
+        </a:xfrm>
+      </p:grpSpPr>
+      <p:sp>
+        <p:nvSpPr>
+          <p:cNvPr id="2" name="タイトル 1">
+            <a:extLst>
+              <a:ext uri="{FF2B5EF4-FFF2-40B4-BE49-F238E27FC236}">
+                <a16:creationId xmlns:a16="http://schemas.microsoft.com/office/drawing/2014/main" id="{89583829-BF05-9016-CB80-D7A16882DBBB}"/>
+              </a:ext>
+            </a:extLst>
+          </p:cNvPr>
+          <p:cNvSpPr>
+            <a:spLocks noGrp="1"/>
+          </p:cNvSpPr>
+          <p:nvPr>
+            <p:ph type="title"/>
+          </p:nvPr>
+        </p:nvSpPr>
+        <p:spPr/>
+        <p:txBody>
+          <a:bodyPr/>
+          <a:lstStyle/>
+          <a:p>
+            <a:r>
+              <a:rPr kumimoji="1" lang="en-US" altLang="ja-JP" dirty="0"/>
+              <a:t>table test slide</a:t>
+            </a:r>
+            <a:r>
+              <a:rPr kumimoji="1" lang="ja-JP" altLang="en-US" dirty="0"/>
+              <a:t> りんご</a:t>
+            </a:r>
+          </a:p>
+        </p:txBody>
+      </p:sp>
+      <p:graphicFrame>
+        <p:nvGraphicFramePr>
+          <p:cNvPr id="4" name="コンテンツ プレースホルダー 3">
+            <a:extLst>
+              <a:ext uri="{FF2B5EF4-FFF2-40B4-BE49-F238E27FC236}">
+                <a16:creationId xmlns:a16="http://schemas.microsoft.com/office/drawing/2014/main" id="{F04E2997-BA48-28B8-F99C-4D577CEF03B0}"/>
+              </a:ext>
+            </a:extLst>
+          </p:cNvPr>
+          <p:cNvGraphicFramePr>
+            <a:graphicFrameLocks noGrp="1"/>
+          </p:cNvGraphicFramePr>
+          <p:nvPr>
+            <p:ph idx="1"/>
+            <p:extLst>
+              <p:ext uri="{D42A27DB-BD31-4B8C-83A1-F6EECF244321}">
+                <p14:modId xmlns:p14="http://schemas.microsoft.com/office/powerpoint/2010/main" val="744243168"/>
+              </p:ext>
+            </p:extLst>
+          </p:nvPr>
+        </p:nvGraphicFramePr>
+        <p:xfrm>
+          <a:off x="1872114" y="4727084"/>
+          <a:ext cx="4937760" cy="2047240"/>
+        </p:xfrm>
+        <a:graphic>
+          <a:graphicData uri="http://schemas.openxmlformats.org/drawingml/2006/table">
+            <a:tbl>
+              <a:tblPr firstRow="1" bandRow="1">
+                <a:tableStyleId>{5C22544A-7EE6-4342-B048-85BDC9FD1C3A}</a:tableStyleId>
+              </a:tblPr>
+              <a:tblGrid>
+                <a:gridCol w="1645920">
+                  <a:extLst>
+                    <a:ext uri="{9D8B030D-6E8A-4147-A177-3AD203B41FA5}">
+                      <a16:colId xmlns:a16="http://schemas.microsoft.com/office/drawing/2014/main" val="1433644907"/>
+                    </a:ext>
+                  </a:extLst>
+                </a:gridCol>
+                <a:gridCol w="845419">
+                  <a:extLst>
+                    <a:ext uri="{9D8B030D-6E8A-4147-A177-3AD203B41FA5}">
+                      <a16:colId xmlns:a16="http://schemas.microsoft.com/office/drawing/2014/main" val="1931103551"/>
+                    </a:ext>
+                  </a:extLst>
+                </a:gridCol>
+                <a:gridCol w="800501">
+                  <a:extLst>
+                    <a:ext uri="{9D8B030D-6E8A-4147-A177-3AD203B41FA5}">
+                      <a16:colId xmlns:a16="http://schemas.microsoft.com/office/drawing/2014/main" val="2593271952"/>
+                    </a:ext>
+                  </a:extLst>
+                </a:gridCol>
+                <a:gridCol w="1645920">
+                  <a:extLst>
+                    <a:ext uri="{9D8B030D-6E8A-4147-A177-3AD203B41FA5}">
+                      <a16:colId xmlns:a16="http://schemas.microsoft.com/office/drawing/2014/main" val="1433446633"/>
+                    </a:ext>
+                  </a:extLst>
+                </a:gridCol>
+              </a:tblGrid>
+              <a:tr h="370840">
+                <a:tc>
+                  <a:txBody>
+                    <a:bodyPr/>
+                    <a:lstStyle/>
+                    <a:p>
+                      <a:r>
+                        <a:rPr kumimoji="1" lang="en-US" altLang="ja-JP" dirty="0"/>
+                        <a:t>head1</a:t>
+                      </a:r>
+                      <a:endParaRPr kumimoji="1" lang="ja-JP" altLang="en-US" dirty="0"/>
+                    </a:p>
+                  </a:txBody>
+                  <a:tcPr/>
+                </a:tc>
+                <a:tc gridSpan="2">
+                  <a:txBody>
+                    <a:bodyPr/>
+                    <a:lstStyle/>
+                    <a:p>
+                      <a:r>
+                        <a:rPr kumimoji="1" lang="en-US" altLang="ja-JP" dirty="0"/>
+                        <a:t>head2</a:t>
+                      </a:r>
+                      <a:endParaRPr kumimoji="1" lang="ja-JP" altLang="en-US" dirty="0"/>
+                    </a:p>
+                  </a:txBody>
+                  <a:tcPr/>
+                </a:tc>
+                <a:tc hMerge="1">
+                  <a:txBody>
+                    <a:bodyPr/>
+                    <a:lstStyle/>
+                    <a:p>
+                      <a:endParaRPr kumimoji="1" lang="ja-JP" altLang="en-US"/>
+                    </a:p>
+                  </a:txBody>
+                  <a:tcPr/>
+                </a:tc>
+                <a:tc>
+                  <a:txBody>
+                    <a:bodyPr/>
+                    <a:lstStyle/>
+                    <a:p>
+                      <a:r>
+                        <a:rPr kumimoji="1" lang="en-US" altLang="ja-JP" dirty="0"/>
+                        <a:t>head3</a:t>
+                      </a:r>
+                      <a:endParaRPr kumimoji="1" lang="ja-JP" altLang="en-US" dirty="0"/>
+                    </a:p>
+                  </a:txBody>
+                  <a:tcPr/>
+                </a:tc>
+                <a:extLst>
+                  <a:ext uri="{0D108BD9-81ED-4DB2-BD59-A6C34878D82A}">
+                    <a16:rowId xmlns:a16="http://schemas.microsoft.com/office/drawing/2014/main" val="590910442"/>
+                  </a:ext>
+                </a:extLst>
+              </a:tr>
+              <a:tr h="370840">
+                <a:tc gridSpan="3">
+                  <a:txBody>
+                    <a:bodyPr/>
+                    <a:lstStyle/>
+                    <a:p>
+                      <a:r>
+                        <a:rPr kumimoji="1" lang="en-US" altLang="ja-JP" dirty="0"/>
+                        <a:t>a1</a:t>
+                      </a:r>
+                      <a:br>
+                        <a:rPr kumimoji="1" lang="en-US" altLang="ja-JP" dirty="0"/>
+                      </a:br>
+                      <a:r>
+                        <a:rPr kumimoji="1" lang="en-US" altLang="ja-JP" dirty="0"/>
+                        <a:t>a2</a:t>
+                      </a:r>
+                      <a:endParaRPr kumimoji="1" lang="ja-JP" altLang="en-US" dirty="0"/>
+                    </a:p>
+                  </a:txBody>
+                  <a:tcPr/>
+                </a:tc>
+                <a:tc hMerge="1">
+                  <a:txBody>
+                    <a:bodyPr/>
+                    <a:lstStyle/>
+                    <a:p>
+                      <a:endParaRPr kumimoji="1" lang="ja-JP" altLang="en-US" dirty="0"/>
+                    </a:p>
+                  </a:txBody>
+                  <a:tcPr/>
+                </a:tc>
+                <a:tc hMerge="1">
+                  <a:txBody>
+                    <a:bodyPr/>
+                    <a:lstStyle/>
+                    <a:p>
+                      <a:endParaRPr kumimoji="1" lang="ja-JP" altLang="en-US"/>
+                    </a:p>
+                  </a:txBody>
+                  <a:tcPr/>
+                </a:tc>
+                <a:tc>
+                  <a:txBody>
+                    <a:bodyPr/>
+                    <a:lstStyle/>
+                    <a:p>
+                      <a:r>
+                        <a:rPr kumimoji="1" lang="en-US" altLang="ja-JP" dirty="0"/>
+                        <a:t>a3</a:t>
+                      </a:r>
+                      <a:endParaRPr kumimoji="1" lang="ja-JP" altLang="en-US" dirty="0"/>
+                    </a:p>
+                  </a:txBody>
+                  <a:tcPr/>
+                </a:tc>
+                <a:extLst>
+                  <a:ext uri="{0D108BD9-81ED-4DB2-BD59-A6C34878D82A}">
+                    <a16:rowId xmlns:a16="http://schemas.microsoft.com/office/drawing/2014/main" val="3628945661"/>
+                  </a:ext>
+                </a:extLst>
+              </a:tr>
+              <a:tr h="370840">
+                <a:tc gridSpan="3">
+                  <a:txBody>
+                    <a:bodyPr/>
+                    <a:lstStyle/>
+                    <a:p>
+                      <a:r>
+                        <a:rPr kumimoji="1" lang="en-US" altLang="ja-JP" dirty="0"/>
+                        <a:t>b1</a:t>
+                      </a:r>
+                      <a:endParaRPr kumimoji="1" lang="ja-JP" altLang="en-US" dirty="0"/>
+                    </a:p>
+                    <a:p>
+                      <a:r>
+                        <a:rPr kumimoji="1" lang="en-US" altLang="ja-JP" dirty="0"/>
+                        <a:t>b2</a:t>
+                      </a:r>
+                      <a:endParaRPr kumimoji="1" lang="ja-JP" altLang="en-US" dirty="0"/>
+                    </a:p>
+                  </a:txBody>
+                  <a:tcPr/>
+                </a:tc>
+                <a:tc hMerge="1">
+                  <a:txBody>
+                    <a:bodyPr/>
+                    <a:lstStyle/>
+                    <a:p>
+                      <a:endParaRPr kumimoji="1" lang="ja-JP" altLang="en-US" dirty="0"/>
+                    </a:p>
+                  </a:txBody>
+                  <a:tcPr/>
+                </a:tc>
+                <a:tc hMerge="1">
+                  <a:txBody>
+                    <a:bodyPr/>
+                    <a:lstStyle/>
+                    <a:p>
+                      <a:endParaRPr kumimoji="1" lang="ja-JP" altLang="en-US" dirty="0"/>
+                    </a:p>
+                  </a:txBody>
+                  <a:tcPr>
+                    <a:lnL w="12700" cap="flat" cmpd="sng" algn="ctr">
+                      <a:solidFill>
+                        <a:schemeClr val="tx1"/>
+                      </a:solidFill>
+                      <a:prstDash val="solid"/>
+                      <a:round/>
+                      <a:headEnd type="none" w="med" len="med"/>
+                      <a:tailEnd type="none" w="med" len="med"/>
+                    </a:lnL>
+                  </a:tcPr>
+                </a:tc>
+                <a:tc rowSpan="2">
+                  <a:txBody>
+                    <a:bodyPr/>
+                    <a:lstStyle/>
+                    <a:p>
+                      <a:r>
+                        <a:rPr kumimoji="1" lang="en-US" altLang="ja-JP" dirty="0"/>
+                        <a:t>b3</a:t>
+                      </a:r>
+                      <a:endParaRPr kumimoji="1" lang="ja-JP" altLang="en-US" dirty="0"/>
+                    </a:p>
+                    <a:p>
+                      <a:r>
+                        <a:rPr kumimoji="1" lang="en-US" altLang="ja-JP" sz="2000" b="1" i="1" dirty="0">
+                          <a:highlight>
+                            <a:srgbClr val="FFFF00"/>
+                          </a:highlight>
+                        </a:rPr>
+                        <a:t>C3</a:t>
+                      </a:r>
+                      <a:endParaRPr kumimoji="1" lang="ja-JP" altLang="en-US" sz="2000" b="1" i="1" dirty="0">
+                        <a:highlight>
+                          <a:srgbClr val="FFFF00"/>
+                        </a:highlight>
+                      </a:endParaRPr>
+                    </a:p>
+                  </a:txBody>
+                  <a:tcPr/>
+                </a:tc>
+                <a:extLst>
+                  <a:ext uri="{0D108BD9-81ED-4DB2-BD59-A6C34878D82A}">
+                    <a16:rowId xmlns:a16="http://schemas.microsoft.com/office/drawing/2014/main" val="1341397582"/>
+                  </a:ext>
+                </a:extLst>
+              </a:tr>
+              <a:tr h="370840">
+                <a:tc>
+                  <a:txBody>
+                    <a:bodyPr/>
+                    <a:lstStyle/>
+                    <a:p>
+                      <a:r>
+                        <a:rPr kumimoji="1" lang="en-US" altLang="ja-JP" sz="2000" b="1" i="1" dirty="0">
+                          <a:solidFill>
+                            <a:srgbClr val="FF0000"/>
+                          </a:solidFill>
+                        </a:rPr>
+                        <a:t>C1</a:t>
+                      </a:r>
+                      <a:endParaRPr kumimoji="1" lang="ja-JP" altLang="en-US" sz="2000" b="1" i="1" dirty="0">
+                        <a:solidFill>
+                          <a:srgbClr val="FF0000"/>
+                        </a:solidFill>
+                      </a:endParaRPr>
+                    </a:p>
+                  </a:txBody>
+                  <a:tcPr/>
+                </a:tc>
+                <a:tc>
+                  <a:txBody>
+                    <a:bodyPr/>
+                    <a:lstStyle/>
+                    <a:p>
+                      <a:r>
+                        <a:rPr kumimoji="1" lang="en-US" altLang="ja-JP" sz="2000" b="1" i="1" strike="sngStrike" dirty="0"/>
+                        <a:t>C2</a:t>
+                      </a:r>
+                      <a:endParaRPr kumimoji="1" lang="ja-JP" altLang="en-US" sz="2000" b="1" i="1" strike="sngStrike" dirty="0"/>
+                    </a:p>
+                  </a:txBody>
+                  <a:tcPr>
+                    <a:lnR w="12700" cap="flat" cmpd="sng" algn="ctr">
+                      <a:solidFill>
+                        <a:schemeClr val="tx1"/>
+                      </a:solidFill>
+                      <a:prstDash val="solid"/>
+                      <a:round/>
+                      <a:headEnd type="none" w="med" len="med"/>
+                      <a:tailEnd type="none" w="med" len="med"/>
+                    </a:lnR>
+                    <a:solidFill>
+                      <a:srgbClr val="FF0000"/>
+                    </a:solidFill>
+                  </a:tcPr>
+                </a:tc>
+                <a:tc>
+                  <a:txBody>
+                    <a:bodyPr/>
+                    <a:lstStyle/>
+                    <a:p>
+                      <a:r>
+                        <a:rPr kumimoji="1" lang="en-US" altLang="ja-JP" sz="2000" b="1" i="1" strike="sngStrike" dirty="0"/>
+                        <a:t>C2-2</a:t>
+                      </a:r>
+                      <a:endParaRPr kumimoji="1" lang="ja-JP" altLang="en-US" sz="2000" b="1" i="1" strike="sngStrike" dirty="0"/>
+                    </a:p>
+                  </a:txBody>
+                  <a:tcPr>
+                    <a:lnL w="12700" cap="flat" cmpd="sng" algn="ctr">
+                      <a:solidFill>
+                        <a:schemeClr val="tx1"/>
+                      </a:solidFill>
+                      <a:prstDash val="solid"/>
+                      <a:round/>
+                      <a:headEnd type="none" w="med" len="med"/>
+                      <a:tailEnd type="none" w="med" len="med"/>
+                    </a:lnL>
+                    <a:solidFill>
+                      <a:srgbClr val="FF0000"/>
+                    </a:solidFill>
+                  </a:tcPr>
+                </a:tc>
+                <a:tc vMerge="1">
+                  <a:txBody>
+                    <a:bodyPr/>
+                    <a:lstStyle/>
+                    <a:p>
+                      <a:endParaRPr kumimoji="1" lang="ja-JP" altLang="en-US" sz="2000" b="1" i="1" dirty="0">
+                        <a:highlight>
+                          <a:srgbClr val="FFFF00"/>
+                        </a:highlight>
+                      </a:endParaRPr>
+                    </a:p>
+                  </a:txBody>
+                  <a:tcPr/>
+                </a:tc>
+                <a:extLst>
+                  <a:ext uri="{0D108BD9-81ED-4DB2-BD59-A6C34878D82A}">
+                    <a16:rowId xmlns:a16="http://schemas.microsoft.com/office/drawing/2014/main" val="3306636690"/>
+                  </a:ext>
+                </a:extLst>
+              </a:tr>
+            </a:tbl>
+          </a:graphicData>
+        </a:graphic>
+      </p:graphicFrame>
+      <p:sp>
+        <p:nvSpPr>
+          <p:cNvPr id="3" name="テキスト ボックス 2">
+            <a:extLst>
+              <a:ext uri="{FF2B5EF4-FFF2-40B4-BE49-F238E27FC236}">
+                <a16:creationId xmlns:a16="http://schemas.microsoft.com/office/drawing/2014/main" id="{4F69FE5D-7D89-E468-3FB7-E7DFEA2149BE}"/>
+              </a:ext>
+            </a:extLst>
+          </p:cNvPr>
+          <p:cNvSpPr txBox="1"/>
+          <p:nvPr/>
+        </p:nvSpPr>
+        <p:spPr>
+          <a:xfrm>
+            <a:off x="565741" y="4542418"/>
+            <a:ext cx="1107996" cy="369332"/>
+          </a:xfrm>
+          <a:prstGeom prst="rect">
+            <a:avLst/>
+          </a:prstGeom>
+          <a:noFill/>
+        </p:spPr>
+        <p:txBody>
+          <a:bodyPr wrap="none" rtlCol="0">
+            <a:spAutoFit/>
+          </a:bodyPr>
+          <a:lstStyle/>
+          <a:p>
+            <a:r>
+              <a:rPr kumimoji="1" lang="ja-JP" altLang="en-US" dirty="0"/>
+              <a:t>補足事項</a:t>
+            </a:r>
+          </a:p>
+        </p:txBody>
+      </p:sp>
+      <p:graphicFrame>
+        <p:nvGraphicFramePr>
+          <p:cNvPr id="5" name="表 4">
+            <a:extLst>
+              <a:ext uri="{FF2B5EF4-FFF2-40B4-BE49-F238E27FC236}">
+                <a16:creationId xmlns:a16="http://schemas.microsoft.com/office/drawing/2014/main" id="{671D0F53-BAFD-9102-358A-992554FC4FED}"/>
+              </a:ext>
+            </a:extLst>
+          </p:cNvPr>
+          <p:cNvGraphicFramePr>
+            <a:graphicFrameLocks noGrp="1"/>
+          </p:cNvGraphicFramePr>
+          <p:nvPr>
+            <p:extLst>
+              <p:ext uri="{D42A27DB-BD31-4B8C-83A1-F6EECF244321}">
+                <p14:modId xmlns:p14="http://schemas.microsoft.com/office/powerpoint/2010/main" val="352836987"/>
+              </p:ext>
+            </p:extLst>
+          </p:nvPr>
+        </p:nvGraphicFramePr>
+        <p:xfrm>
+          <a:off x="1119739" y="1313046"/>
+          <a:ext cx="7562249" cy="3662680"/>
+        </p:xfrm>
+        <a:graphic>
+          <a:graphicData uri="http://schemas.openxmlformats.org/drawingml/2006/table">
+            <a:tbl>
+              <a:tblPr firstRow="1" bandRow="1">
+                <a:tableStyleId>{5C22544A-7EE6-4342-B048-85BDC9FD1C3A}</a:tableStyleId>
+              </a:tblPr>
+              <a:tblGrid>
+                <a:gridCol w="2259000">
+                  <a:extLst>
+                    <a:ext uri="{9D8B030D-6E8A-4147-A177-3AD203B41FA5}">
+                      <a16:colId xmlns:a16="http://schemas.microsoft.com/office/drawing/2014/main" val="46205011"/>
+                    </a:ext>
+                  </a:extLst>
+                </a:gridCol>
+                <a:gridCol w="2259000">
+                  <a:extLst>
+                    <a:ext uri="{9D8B030D-6E8A-4147-A177-3AD203B41FA5}">
+                      <a16:colId xmlns:a16="http://schemas.microsoft.com/office/drawing/2014/main" val="2222435913"/>
+                    </a:ext>
+                  </a:extLst>
+                </a:gridCol>
+                <a:gridCol w="3044249">
+                  <a:extLst>
+                    <a:ext uri="{9D8B030D-6E8A-4147-A177-3AD203B41FA5}">
+                      <a16:colId xmlns:a16="http://schemas.microsoft.com/office/drawing/2014/main" val="1428640392"/>
+                    </a:ext>
+                  </a:extLst>
+                </a:gridCol>
+              </a:tblGrid>
+              <a:tr h="343301">
+                <a:tc>
+                  <a:txBody>
+                    <a:bodyPr/>
+                    <a:lstStyle/>
+                    <a:p>
+                      <a:r>
+                        <a:rPr kumimoji="1" lang="en-US" altLang="ja-JP" dirty="0"/>
+                        <a:t>No</a:t>
+                      </a:r>
+                      <a:endParaRPr kumimoji="1" lang="ja-JP" altLang="en-US" dirty="0"/>
+                    </a:p>
+                  </a:txBody>
+                  <a:tcPr/>
+                </a:tc>
+                <a:tc>
+                  <a:txBody>
+                    <a:bodyPr/>
+                    <a:lstStyle/>
+                    <a:p>
+                      <a:r>
+                        <a:rPr kumimoji="1" lang="ja-JP" altLang="en-US" dirty="0"/>
+                        <a:t>課題</a:t>
+                      </a:r>
+                    </a:p>
+                  </a:txBody>
+                  <a:tcPr/>
+                </a:tc>
+                <a:tc>
+                  <a:txBody>
+                    <a:bodyPr/>
+                    <a:lstStyle/>
+                    <a:p>
+                      <a:r>
+                        <a:rPr kumimoji="1" lang="ja-JP" altLang="en-US" dirty="0"/>
+                        <a:t>補足</a:t>
+                      </a:r>
+                    </a:p>
+                  </a:txBody>
+                  <a:tcPr/>
+                </a:tc>
+                <a:extLst>
+                  <a:ext uri="{0D108BD9-81ED-4DB2-BD59-A6C34878D82A}">
+                    <a16:rowId xmlns:a16="http://schemas.microsoft.com/office/drawing/2014/main" val="3389817405"/>
+                  </a:ext>
+                </a:extLst>
+              </a:tr>
+              <a:tr h="370840">
+                <a:tc>
+                  <a:txBody>
+                    <a:bodyPr/>
+                    <a:lstStyle/>
+                    <a:p>
+                      <a:r>
+                        <a:rPr kumimoji="1" lang="en-US" altLang="ja-JP" dirty="0"/>
+                        <a:t>4</a:t>
+                      </a:r>
+                      <a:endParaRPr kumimoji="1" lang="ja-JP" altLang="en-US" dirty="0"/>
+                    </a:p>
+                  </a:txBody>
+                  <a:tcPr/>
+                </a:tc>
+                <a:tc>
+                  <a:txBody>
+                    <a:bodyPr/>
+                    <a:lstStyle/>
+                    <a:p>
+                      <a:r>
+                        <a:rPr kumimoji="1" lang="ja-JP" altLang="en-US" dirty="0"/>
+                        <a:t>加工用不足</a:t>
+                      </a:r>
+                    </a:p>
+                  </a:txBody>
+                  <a:tcPr/>
+                </a:tc>
+                <a:tc>
+                  <a:txBody>
+                    <a:bodyPr/>
+                    <a:lstStyle/>
+                    <a:p>
+                      <a:r>
+                        <a:rPr kumimoji="1" lang="ja-JP" altLang="en-US" sz="1200" dirty="0"/>
+                        <a:t>社からのジャム用依頼</a:t>
+                      </a:r>
+                    </a:p>
+                  </a:txBody>
+                  <a:tcPr/>
+                </a:tc>
+                <a:extLst>
+                  <a:ext uri="{0D108BD9-81ED-4DB2-BD59-A6C34878D82A}">
+                    <a16:rowId xmlns:a16="http://schemas.microsoft.com/office/drawing/2014/main" val="1705669622"/>
+                  </a:ext>
+                </a:extLst>
+              </a:tr>
+              <a:tr h="370840">
+                <a:tc>
+                  <a:txBody>
+                    <a:bodyPr/>
+                    <a:lstStyle/>
+                    <a:p>
+                      <a:r>
+                        <a:rPr kumimoji="1" lang="en-US" altLang="ja-JP" dirty="0"/>
+                        <a:t>5</a:t>
+                      </a:r>
+                      <a:endParaRPr kumimoji="1" lang="ja-JP" altLang="en-US" dirty="0"/>
+                    </a:p>
+                  </a:txBody>
+                  <a:tcPr/>
+                </a:tc>
+                <a:tc>
+                  <a:txBody>
+                    <a:bodyPr/>
+                    <a:lstStyle/>
+                    <a:p>
+                      <a:r>
+                        <a:rPr kumimoji="1" lang="ja-JP" altLang="en-US" dirty="0"/>
+                        <a:t>運搬時の破損</a:t>
+                      </a:r>
+                    </a:p>
+                  </a:txBody>
+                  <a:tcPr/>
+                </a:tc>
+                <a:tc>
+                  <a:txBody>
+                    <a:bodyPr/>
+                    <a:lstStyle/>
+                    <a:p>
+                      <a:r>
+                        <a:rPr kumimoji="1" lang="ja-JP" altLang="en-US" sz="1200" dirty="0"/>
+                        <a:t>運搬業者毎の破損率</a:t>
+                      </a:r>
+                      <a:endParaRPr kumimoji="1" lang="en-US" altLang="ja-JP" sz="1200" dirty="0"/>
+                    </a:p>
+                    <a:p>
+                      <a:r>
+                        <a:rPr kumimoji="1" lang="en-US" altLang="ja-JP" sz="1200" dirty="0"/>
+                        <a:t>[</a:t>
+                      </a:r>
+                      <a:r>
+                        <a:rPr kumimoji="1" lang="ja-JP" altLang="en-US" sz="1200" dirty="0"/>
+                        <a:t>年間</a:t>
+                      </a:r>
+                      <a:r>
+                        <a:rPr kumimoji="1" lang="en-US" altLang="ja-JP" sz="1200" dirty="0"/>
+                        <a:t>]</a:t>
+                      </a:r>
+                    </a:p>
+                    <a:p>
+                      <a:r>
+                        <a:rPr kumimoji="1" lang="en-US" altLang="ja-JP" sz="1200" dirty="0"/>
+                        <a:t>ABC: 230kg(20t)</a:t>
+                      </a:r>
+                    </a:p>
+                    <a:p>
+                      <a:pPr marL="0" marR="0" lvl="0" indent="0" algn="l" defTabSz="457200" rtl="0" eaLnBrk="1" fontAlgn="auto" latinLnBrk="0" hangingPunct="1">
+                        <a:lnSpc>
+                          <a:spcPct val="100000"/>
+                        </a:lnSpc>
+                        <a:spcBef>
+                          <a:spcPts val="0"/>
+                        </a:spcBef>
+                        <a:spcAft>
+                          <a:spcPts val="0"/>
+                        </a:spcAft>
+                        <a:buClrTx/>
+                        <a:buSzTx/>
+                        <a:buFontTx/>
+                        <a:buNone/>
+                        <a:tabLst/>
+                        <a:defRPr/>
+                      </a:pPr>
+                      <a:r>
+                        <a:rPr kumimoji="1" lang="en-US" altLang="ja-JP" sz="1200" dirty="0"/>
+                        <a:t>XYZ: 30kg(6t)</a:t>
+                      </a:r>
+                    </a:p>
+                    <a:p>
+                      <a:r>
+                        <a:rPr kumimoji="1" lang="ja-JP" altLang="en-US" sz="1200" dirty="0"/>
+                        <a:t>社有トラック</a:t>
+                      </a:r>
+                      <a:r>
+                        <a:rPr kumimoji="1" lang="en-US" altLang="ja-JP" sz="1200" dirty="0"/>
+                        <a:t>: 103kg(18t)</a:t>
+                      </a:r>
+                    </a:p>
+                    <a:p>
+                      <a:r>
+                        <a:rPr kumimoji="1" lang="en-US" altLang="ja-JP" sz="1200" dirty="0"/>
+                        <a:t>[</a:t>
+                      </a:r>
+                      <a:r>
+                        <a:rPr kumimoji="1" lang="ja-JP" altLang="en-US" sz="1200" dirty="0"/>
+                        <a:t>先月</a:t>
+                      </a:r>
+                      <a:r>
+                        <a:rPr kumimoji="1" lang="en-US" altLang="ja-JP" sz="1200" dirty="0"/>
+                        <a:t>]</a:t>
+                      </a:r>
+                    </a:p>
+                    <a:p>
+                      <a:r>
+                        <a:rPr kumimoji="1" lang="en-US" altLang="ja-JP" sz="1200" dirty="0"/>
+                        <a:t>ABC: 20kg(1t)</a:t>
+                      </a:r>
+                    </a:p>
+                    <a:p>
+                      <a:r>
+                        <a:rPr kumimoji="1" lang="ja-JP" altLang="en-US" sz="1200" dirty="0"/>
+                        <a:t>社有トラック</a:t>
+                      </a:r>
+                      <a:r>
+                        <a:rPr kumimoji="1" lang="en-US" altLang="ja-JP" sz="1200" dirty="0"/>
+                        <a:t>: 50kg(2t)</a:t>
+                      </a:r>
+                    </a:p>
+                    <a:p>
+                      <a:r>
+                        <a:rPr kumimoji="1" lang="en-US" altLang="ja-JP" sz="1200" dirty="0"/>
+                        <a:t>[</a:t>
+                      </a:r>
+                      <a:r>
+                        <a:rPr kumimoji="1" lang="ja-JP" altLang="en-US" sz="1200" dirty="0"/>
+                        <a:t>今月</a:t>
+                      </a:r>
+                      <a:r>
+                        <a:rPr kumimoji="1" lang="en-US" altLang="ja-JP" sz="1200" dirty="0"/>
+                        <a:t>]</a:t>
+                      </a:r>
+                    </a:p>
+                    <a:p>
+                      <a:r>
+                        <a:rPr kumimoji="1" lang="en-US" altLang="ja-JP" sz="1200" dirty="0"/>
+                        <a:t>ABC: 7kg(0.5t)</a:t>
+                      </a:r>
+                      <a:br>
+                        <a:rPr kumimoji="1" lang="en-US" altLang="ja-JP" sz="1200" dirty="0"/>
+                      </a:br>
+                      <a:r>
+                        <a:rPr kumimoji="1" lang="ja-JP" altLang="en-US" sz="1200" dirty="0"/>
+                        <a:t>他は破損なし </a:t>
+                      </a:r>
+                      <a:r>
+                        <a:rPr kumimoji="1" lang="en-US" altLang="ja-JP" sz="1200" dirty="0"/>
+                        <a:t>(3t)</a:t>
+                      </a:r>
+                    </a:p>
+                  </a:txBody>
+                  <a:tcPr/>
+                </a:tc>
+                <a:extLst>
+                  <a:ext uri="{0D108BD9-81ED-4DB2-BD59-A6C34878D82A}">
+                    <a16:rowId xmlns:a16="http://schemas.microsoft.com/office/drawing/2014/main" val="2464415206"/>
+                  </a:ext>
+                </a:extLst>
+              </a:tr>
+              <a:tr h="370840">
+                <a:tc>
+                  <a:txBody>
+                    <a:bodyPr/>
+                    <a:lstStyle/>
+                    <a:p>
+                      <a:r>
+                        <a:rPr kumimoji="1" lang="en-US" altLang="ja-JP" dirty="0"/>
+                        <a:t>6</a:t>
+                      </a:r>
+                      <a:endParaRPr kumimoji="1" lang="ja-JP" altLang="en-US" dirty="0"/>
+                    </a:p>
+                  </a:txBody>
+                  <a:tcPr/>
+                </a:tc>
+                <a:tc>
+                  <a:txBody>
+                    <a:bodyPr/>
+                    <a:lstStyle/>
+                    <a:p>
+                      <a:r>
+                        <a:rPr kumimoji="1" lang="ja-JP" altLang="en-US" dirty="0"/>
+                        <a:t>収穫量が明確でない</a:t>
+                      </a:r>
+                    </a:p>
+                  </a:txBody>
+                  <a:tcPr/>
+                </a:tc>
+                <a:tc>
+                  <a:txBody>
+                    <a:bodyPr/>
+                    <a:lstStyle/>
+                    <a:p>
+                      <a:r>
+                        <a:rPr kumimoji="1" lang="ja-JP" altLang="en-US" sz="1200" dirty="0"/>
+                        <a:t>先月までの記録が破棄</a:t>
+                      </a:r>
+                      <a:br>
+                        <a:rPr kumimoji="1" lang="en-US" altLang="ja-JP" sz="1200" dirty="0"/>
+                      </a:br>
+                      <a:r>
+                        <a:rPr kumimoji="1" lang="en-US" altLang="ja-JP" sz="1200" dirty="0"/>
+                        <a:t>[</a:t>
+                      </a:r>
+                      <a:r>
+                        <a:rPr kumimoji="1" lang="ja-JP" altLang="en-US" sz="1200" dirty="0"/>
+                        <a:t>今月</a:t>
+                      </a:r>
+                      <a:r>
+                        <a:rPr kumimoji="1" lang="en-US" altLang="ja-JP" sz="1200" dirty="0"/>
+                        <a:t>]</a:t>
+                      </a:r>
+                      <a:br>
+                        <a:rPr kumimoji="1" lang="en-US" altLang="ja-JP" sz="1200" dirty="0"/>
+                      </a:br>
+                      <a:r>
+                        <a:rPr kumimoji="1" lang="en-US" altLang="ja-JP" sz="1200" dirty="0"/>
+                        <a:t>30t</a:t>
+                      </a:r>
+                    </a:p>
+                    <a:p>
+                      <a:r>
+                        <a:rPr kumimoji="1" lang="en-US" altLang="ja-JP" sz="1200" dirty="0"/>
+                        <a:t>S,L,M</a:t>
+                      </a:r>
+                      <a:r>
+                        <a:rPr kumimoji="1" lang="ja-JP" altLang="en-US" sz="1200" dirty="0"/>
+                        <a:t>含む</a:t>
+                      </a:r>
+                    </a:p>
+                  </a:txBody>
+                  <a:tcPr/>
+                </a:tc>
+                <a:extLst>
+                  <a:ext uri="{0D108BD9-81ED-4DB2-BD59-A6C34878D82A}">
+                    <a16:rowId xmlns:a16="http://schemas.microsoft.com/office/drawing/2014/main" val="3380041663"/>
+                  </a:ext>
+                </a:extLst>
+              </a:tr>
+            </a:tbl>
+          </a:graphicData>
+        </a:graphic>
+      </p:graphicFrame>
+    </p:spTree>
+    <p:extLst>
+      <p:ext uri="{BB962C8B-B14F-4D97-AF65-F5344CB8AC3E}">
+        <p14:creationId xmlns:p14="http://schemas.microsoft.com/office/powerpoint/2010/main" val="996254231"/>
       </p:ext>
     </p:extLst>
   </p:cSld>

</xml_diff>